<commit_message>
Add conclusion to ppt and docu
</commit_message>
<xml_diff>
--- a/submission/AI-based_recognition_for_TENG_Nano_sensors.pptx
+++ b/submission/AI-based_recognition_for_TENG_Nano_sensors.pptx
@@ -28,23 +28,26 @@
     <p:sldId id="273" r:id="rId23"/>
     <p:sldId id="274" r:id="rId24"/>
     <p:sldId id="275" r:id="rId25"/>
+    <p:sldId id="276" r:id="rId26"/>
+    <p:sldId id="277" r:id="rId27"/>
+    <p:sldId id="278" r:id="rId28"/>
   </p:sldIdLst>
   <p:sldSz cy="5143500" cx="9144000"/>
   <p:notesSz cx="6858000" cy="9144000"/>
   <p:embeddedFontLst>
     <p:embeddedFont>
       <p:font typeface="Raleway"/>
-      <p:regular r:id="rId26"/>
-      <p:bold r:id="rId27"/>
-      <p:italic r:id="rId28"/>
-      <p:boldItalic r:id="rId29"/>
+      <p:regular r:id="rId29"/>
+      <p:bold r:id="rId30"/>
+      <p:italic r:id="rId31"/>
+      <p:boldItalic r:id="rId32"/>
     </p:embeddedFont>
     <p:embeddedFont>
       <p:font typeface="Lato"/>
-      <p:regular r:id="rId30"/>
-      <p:bold r:id="rId31"/>
-      <p:italic r:id="rId32"/>
-      <p:boldItalic r:id="rId33"/>
+      <p:regular r:id="rId33"/>
+      <p:bold r:id="rId34"/>
+      <p:italic r:id="rId35"/>
+      <p:boldItalic r:id="rId36"/>
     </p:embeddedFont>
   </p:embeddedFontLst>
   <p:defaultTextStyle>
@@ -839,7 +842,7 @@
       </p:grpSpPr>
       <p:sp>
         <p:nvSpPr>
-          <p:cNvPr id="143" name="Google Shape;143;g35fdfb159fe_0_95:notes"/>
+          <p:cNvPr id="143" name="Google Shape;143;g367ca13a3cc_0_11:notes"/>
           <p:cNvSpPr/>
           <p:nvPr>
             <p:ph idx="2" type="sldImg"/>
@@ -874,7 +877,7 @@
       </p:sp>
       <p:sp>
         <p:nvSpPr>
-          <p:cNvPr id="144" name="Google Shape;144;g35fdfb159fe_0_95:notes"/>
+          <p:cNvPr id="144" name="Google Shape;144;g367ca13a3cc_0_11:notes"/>
           <p:cNvSpPr txBox="1"/>
           <p:nvPr>
             <p:ph idx="1" type="body"/>
@@ -924,7 +927,7 @@
   <p:cSld>
     <p:spTree>
       <p:nvGrpSpPr>
-        <p:cNvPr id="150" name="Shape 150"/>
+        <p:cNvPr id="149" name="Shape 149"/>
         <p:cNvGrpSpPr/>
         <p:nvPr/>
       </p:nvGrpSpPr>
@@ -938,7 +941,7 @@
       </p:grpSpPr>
       <p:sp>
         <p:nvSpPr>
-          <p:cNvPr id="151" name="Google Shape;151;g35fdfb159fe_0_127:notes"/>
+          <p:cNvPr id="150" name="Google Shape;150;g35fdfb159fe_0_95:notes"/>
           <p:cNvSpPr/>
           <p:nvPr>
             <p:ph idx="2" type="sldImg"/>
@@ -973,7 +976,7 @@
       </p:sp>
       <p:sp>
         <p:nvSpPr>
-          <p:cNvPr id="152" name="Google Shape;152;g35fdfb159fe_0_127:notes"/>
+          <p:cNvPr id="151" name="Google Shape;151;g35fdfb159fe_0_95:notes"/>
           <p:cNvSpPr txBox="1"/>
           <p:nvPr>
             <p:ph idx="1" type="body"/>
@@ -1023,7 +1026,7 @@
   <p:cSld>
     <p:spTree>
       <p:nvGrpSpPr>
-        <p:cNvPr id="158" name="Shape 158"/>
+        <p:cNvPr id="157" name="Shape 157"/>
         <p:cNvGrpSpPr/>
         <p:nvPr/>
       </p:nvGrpSpPr>
@@ -1037,7 +1040,7 @@
       </p:grpSpPr>
       <p:sp>
         <p:nvSpPr>
-          <p:cNvPr id="159" name="Google Shape;159;g35fdfb159fe_0_134:notes"/>
+          <p:cNvPr id="158" name="Google Shape;158;g35fdfb159fe_0_127:notes"/>
           <p:cNvSpPr/>
           <p:nvPr>
             <p:ph idx="2" type="sldImg"/>
@@ -1072,7 +1075,7 @@
       </p:sp>
       <p:sp>
         <p:nvSpPr>
-          <p:cNvPr id="160" name="Google Shape;160;g35fdfb159fe_0_134:notes"/>
+          <p:cNvPr id="159" name="Google Shape;159;g35fdfb159fe_0_127:notes"/>
           <p:cNvSpPr txBox="1"/>
           <p:nvPr>
             <p:ph idx="1" type="body"/>
@@ -1122,7 +1125,7 @@
   <p:cSld>
     <p:spTree>
       <p:nvGrpSpPr>
-        <p:cNvPr id="166" name="Shape 166"/>
+        <p:cNvPr id="165" name="Shape 165"/>
         <p:cNvGrpSpPr/>
         <p:nvPr/>
       </p:nvGrpSpPr>
@@ -1136,7 +1139,7 @@
       </p:grpSpPr>
       <p:sp>
         <p:nvSpPr>
-          <p:cNvPr id="167" name="Google Shape;167;g35fdfb159fe_0_141:notes"/>
+          <p:cNvPr id="166" name="Google Shape;166;g35fdfb159fe_0_134:notes"/>
           <p:cNvSpPr/>
           <p:nvPr>
             <p:ph idx="2" type="sldImg"/>
@@ -1171,7 +1174,7 @@
       </p:sp>
       <p:sp>
         <p:nvSpPr>
-          <p:cNvPr id="168" name="Google Shape;168;g35fdfb159fe_0_141:notes"/>
+          <p:cNvPr id="167" name="Google Shape;167;g35fdfb159fe_0_134:notes"/>
           <p:cNvSpPr txBox="1"/>
           <p:nvPr>
             <p:ph idx="1" type="body"/>
@@ -1221,7 +1224,7 @@
   <p:cSld>
     <p:spTree>
       <p:nvGrpSpPr>
-        <p:cNvPr id="174" name="Shape 174"/>
+        <p:cNvPr id="173" name="Shape 173"/>
         <p:cNvGrpSpPr/>
         <p:nvPr/>
       </p:nvGrpSpPr>
@@ -1235,7 +1238,7 @@
       </p:grpSpPr>
       <p:sp>
         <p:nvSpPr>
-          <p:cNvPr id="175" name="Google Shape;175;g35fdfb159fe_0_148:notes"/>
+          <p:cNvPr id="174" name="Google Shape;174;g35fdfb159fe_0_141:notes"/>
           <p:cNvSpPr/>
           <p:nvPr>
             <p:ph idx="2" type="sldImg"/>
@@ -1270,7 +1273,7 @@
       </p:sp>
       <p:sp>
         <p:nvSpPr>
-          <p:cNvPr id="176" name="Google Shape;176;g35fdfb159fe_0_148:notes"/>
+          <p:cNvPr id="175" name="Google Shape;175;g35fdfb159fe_0_141:notes"/>
           <p:cNvSpPr txBox="1"/>
           <p:nvPr>
             <p:ph idx="1" type="body"/>
@@ -1320,7 +1323,7 @@
   <p:cSld>
     <p:spTree>
       <p:nvGrpSpPr>
-        <p:cNvPr id="182" name="Shape 182"/>
+        <p:cNvPr id="181" name="Shape 181"/>
         <p:cNvGrpSpPr/>
         <p:nvPr/>
       </p:nvGrpSpPr>
@@ -1334,7 +1337,7 @@
       </p:grpSpPr>
       <p:sp>
         <p:nvSpPr>
-          <p:cNvPr id="183" name="Google Shape;183;g3619227d64c_0_12:notes"/>
+          <p:cNvPr id="182" name="Google Shape;182;g35fdfb159fe_0_148:notes"/>
           <p:cNvSpPr/>
           <p:nvPr>
             <p:ph idx="2" type="sldImg"/>
@@ -1369,7 +1372,7 @@
       </p:sp>
       <p:sp>
         <p:nvSpPr>
-          <p:cNvPr id="184" name="Google Shape;184;g3619227d64c_0_12:notes"/>
+          <p:cNvPr id="183" name="Google Shape;183;g35fdfb159fe_0_148:notes"/>
           <p:cNvSpPr txBox="1"/>
           <p:nvPr>
             <p:ph idx="1" type="body"/>
@@ -1419,7 +1422,7 @@
   <p:cSld>
     <p:spTree>
       <p:nvGrpSpPr>
-        <p:cNvPr id="188" name="Shape 188"/>
+        <p:cNvPr id="189" name="Shape 189"/>
         <p:cNvGrpSpPr/>
         <p:nvPr/>
       </p:nvGrpSpPr>
@@ -1433,7 +1436,7 @@
       </p:grpSpPr>
       <p:sp>
         <p:nvSpPr>
-          <p:cNvPr id="189" name="Google Shape;189;g35fdfb159fe_0_155:notes"/>
+          <p:cNvPr id="190" name="Google Shape;190;g3619227d64c_0_12:notes"/>
           <p:cNvSpPr/>
           <p:nvPr>
             <p:ph idx="2" type="sldImg"/>
@@ -1468,7 +1471,7 @@
       </p:sp>
       <p:sp>
         <p:nvSpPr>
-          <p:cNvPr id="190" name="Google Shape;190;g35fdfb159fe_0_155:notes"/>
+          <p:cNvPr id="191" name="Google Shape;191;g3619227d64c_0_12:notes"/>
           <p:cNvSpPr txBox="1"/>
           <p:nvPr>
             <p:ph idx="1" type="body"/>
@@ -1518,7 +1521,7 @@
   <p:cSld>
     <p:spTree>
       <p:nvGrpSpPr>
-        <p:cNvPr id="198" name="Shape 198"/>
+        <p:cNvPr id="195" name="Shape 195"/>
         <p:cNvGrpSpPr/>
         <p:nvPr/>
       </p:nvGrpSpPr>
@@ -1532,7 +1535,7 @@
       </p:grpSpPr>
       <p:sp>
         <p:nvSpPr>
-          <p:cNvPr id="199" name="Google Shape;199;g3619227d64c_0_0:notes"/>
+          <p:cNvPr id="196" name="Google Shape;196;g35fdfb159fe_0_155:notes"/>
           <p:cNvSpPr/>
           <p:nvPr>
             <p:ph idx="2" type="sldImg"/>
@@ -1567,7 +1570,7 @@
       </p:sp>
       <p:sp>
         <p:nvSpPr>
-          <p:cNvPr id="200" name="Google Shape;200;g3619227d64c_0_0:notes"/>
+          <p:cNvPr id="197" name="Google Shape;197;g35fdfb159fe_0_155:notes"/>
           <p:cNvSpPr txBox="1"/>
           <p:nvPr>
             <p:ph idx="1" type="body"/>
@@ -1617,7 +1620,7 @@
   <p:cSld>
     <p:spTree>
       <p:nvGrpSpPr>
-        <p:cNvPr id="204" name="Shape 204"/>
+        <p:cNvPr id="205" name="Shape 205"/>
         <p:cNvGrpSpPr/>
         <p:nvPr/>
       </p:nvGrpSpPr>
@@ -1631,7 +1634,7 @@
       </p:grpSpPr>
       <p:sp>
         <p:nvSpPr>
-          <p:cNvPr id="205" name="Google Shape;205;g3619227d64c_0_6:notes"/>
+          <p:cNvPr id="206" name="Google Shape;206;g3619227d64c_0_0:notes"/>
           <p:cNvSpPr/>
           <p:nvPr>
             <p:ph idx="2" type="sldImg"/>
@@ -1666,7 +1669,7 @@
       </p:sp>
       <p:sp>
         <p:nvSpPr>
-          <p:cNvPr id="206" name="Google Shape;206;g3619227d64c_0_6:notes"/>
+          <p:cNvPr id="207" name="Google Shape;207;g3619227d64c_0_0:notes"/>
           <p:cNvSpPr txBox="1"/>
           <p:nvPr>
             <p:ph idx="1" type="body"/>
@@ -1716,7 +1719,7 @@
   <p:cSld>
     <p:spTree>
       <p:nvGrpSpPr>
-        <p:cNvPr id="209" name="Shape 209"/>
+        <p:cNvPr id="211" name="Shape 211"/>
         <p:cNvGrpSpPr/>
         <p:nvPr/>
       </p:nvGrpSpPr>
@@ -1730,7 +1733,7 @@
       </p:grpSpPr>
       <p:sp>
         <p:nvSpPr>
-          <p:cNvPr id="210" name="Google Shape;210;g361e6f52f36_4_0:notes"/>
+          <p:cNvPr id="212" name="Google Shape;212;g3619227d64c_0_6:notes"/>
           <p:cNvSpPr/>
           <p:nvPr>
             <p:ph idx="2" type="sldImg"/>
@@ -1765,7 +1768,7 @@
       </p:sp>
       <p:sp>
         <p:nvSpPr>
-          <p:cNvPr id="211" name="Google Shape;211;g361e6f52f36_4_0:notes"/>
+          <p:cNvPr id="213" name="Google Shape;213;g3619227d64c_0_6:notes"/>
           <p:cNvSpPr txBox="1"/>
           <p:nvPr>
             <p:ph idx="1" type="body"/>
@@ -1914,7 +1917,7 @@
   <p:cSld>
     <p:spTree>
       <p:nvGrpSpPr>
-        <p:cNvPr id="215" name="Shape 215"/>
+        <p:cNvPr id="216" name="Shape 216"/>
         <p:cNvGrpSpPr/>
         <p:nvPr/>
       </p:nvGrpSpPr>
@@ -1928,7 +1931,7 @@
       </p:grpSpPr>
       <p:sp>
         <p:nvSpPr>
-          <p:cNvPr id="216" name="Google Shape;216;g361e6f52f36_0_5:notes"/>
+          <p:cNvPr id="217" name="Google Shape;217;g367098868c1_0_0:notes"/>
           <p:cNvSpPr/>
           <p:nvPr>
             <p:ph idx="2" type="sldImg"/>
@@ -1963,7 +1966,304 @@
       </p:sp>
       <p:sp>
         <p:nvSpPr>
-          <p:cNvPr id="217" name="Google Shape;217;g361e6f52f36_0_5:notes"/>
+          <p:cNvPr id="218" name="Google Shape;218;g367098868c1_0_0:notes"/>
+          <p:cNvSpPr txBox="1"/>
+          <p:nvPr>
+            <p:ph idx="1" type="body"/>
+          </p:nvPr>
+        </p:nvSpPr>
+        <p:spPr>
+          <a:xfrm>
+            <a:off x="685800" y="4343400"/>
+            <a:ext cx="5486400" cy="4114800"/>
+          </a:xfrm>
+          <a:prstGeom prst="rect">
+            <a:avLst/>
+          </a:prstGeom>
+        </p:spPr>
+        <p:txBody>
+          <a:bodyPr anchorCtr="0" anchor="t" bIns="91425" lIns="91425" spcFirstLastPara="1" rIns="91425" wrap="square" tIns="91425">
+            <a:noAutofit/>
+          </a:bodyPr>
+          <a:lstStyle/>
+          <a:p>
+            <a:pPr indent="0" lvl="0" marL="0" rtl="0" algn="l">
+              <a:spcBef>
+                <a:spcPts val="0"/>
+              </a:spcBef>
+              <a:spcAft>
+                <a:spcPts val="0"/>
+              </a:spcAft>
+              <a:buNone/>
+            </a:pPr>
+            <a:r>
+              <a:t/>
+            </a:r>
+            <a:endParaRPr/>
+          </a:p>
+        </p:txBody>
+      </p:sp>
+    </p:spTree>
+  </p:cSld>
+  <p:clrMapOvr>
+    <a:masterClrMapping/>
+  </p:clrMapOvr>
+</p:notes>
+</file>
+
+<file path=ppt/notesSlides/notesSlide21.xml><?xml version="1.0" encoding="utf-8"?>
+<p:notes xmlns:a="http://schemas.openxmlformats.org/drawingml/2006/main" xmlns:r="http://schemas.openxmlformats.org/officeDocument/2006/relationships" xmlns:mc="http://schemas.openxmlformats.org/markup-compatibility/2006" xmlns:mv="urn:schemas-microsoft-com:mac:vml" xmlns:p="http://schemas.openxmlformats.org/presentationml/2006/main" xmlns:c="http://schemas.openxmlformats.org/drawingml/2006/chart" xmlns:dgm="http://schemas.openxmlformats.org/drawingml/2006/diagram" xmlns:o="urn:schemas-microsoft-com:office:office" xmlns:v="urn:schemas-microsoft-com:vml" xmlns:pvml="urn:schemas-microsoft-com:office:powerpoint" xmlns:com="http://schemas.openxmlformats.org/drawingml/2006/compatibility" xmlns:p14="http://schemas.microsoft.com/office/powerpoint/2010/main" xmlns:p15="http://schemas.microsoft.com/office/powerpoint/2012/main" xmlns:ahyp="http://schemas.microsoft.com/office/drawing/2018/hyperlinkcolor" showMasterPhAnim="0" showMasterSp="0">
+  <p:cSld>
+    <p:spTree>
+      <p:nvGrpSpPr>
+        <p:cNvPr id="223" name="Shape 223"/>
+        <p:cNvGrpSpPr/>
+        <p:nvPr/>
+      </p:nvGrpSpPr>
+      <p:grpSpPr>
+        <a:xfrm>
+          <a:off x="0" y="0"/>
+          <a:ext cx="0" cy="0"/>
+          <a:chOff x="0" y="0"/>
+          <a:chExt cx="0" cy="0"/>
+        </a:xfrm>
+      </p:grpSpPr>
+      <p:sp>
+        <p:nvSpPr>
+          <p:cNvPr id="224" name="Google Shape;224;g367ca13a3cc_0_17:notes"/>
+          <p:cNvSpPr/>
+          <p:nvPr>
+            <p:ph idx="2" type="sldImg"/>
+          </p:nvPr>
+        </p:nvSpPr>
+        <p:spPr>
+          <a:xfrm>
+            <a:off x="381300" y="685800"/>
+            <a:ext cx="6096000" cy="3429000"/>
+          </a:xfrm>
+          <a:custGeom>
+            <a:rect b="b" l="l" r="r" t="t"/>
+            <a:pathLst>
+              <a:path extrusionOk="0" h="120000" w="120000">
+                <a:moveTo>
+                  <a:pt x="0" y="0"/>
+                </a:moveTo>
+                <a:lnTo>
+                  <a:pt x="120000" y="0"/>
+                </a:lnTo>
+                <a:lnTo>
+                  <a:pt x="120000" y="120000"/>
+                </a:lnTo>
+                <a:lnTo>
+                  <a:pt x="0" y="120000"/>
+                </a:lnTo>
+                <a:close/>
+              </a:path>
+            </a:pathLst>
+          </a:custGeom>
+        </p:spPr>
+      </p:sp>
+      <p:sp>
+        <p:nvSpPr>
+          <p:cNvPr id="225" name="Google Shape;225;g367ca13a3cc_0_17:notes"/>
+          <p:cNvSpPr txBox="1"/>
+          <p:nvPr>
+            <p:ph idx="1" type="body"/>
+          </p:nvPr>
+        </p:nvSpPr>
+        <p:spPr>
+          <a:xfrm>
+            <a:off x="685800" y="4343400"/>
+            <a:ext cx="5486400" cy="4114800"/>
+          </a:xfrm>
+          <a:prstGeom prst="rect">
+            <a:avLst/>
+          </a:prstGeom>
+        </p:spPr>
+        <p:txBody>
+          <a:bodyPr anchorCtr="0" anchor="t" bIns="91425" lIns="91425" spcFirstLastPara="1" rIns="91425" wrap="square" tIns="91425">
+            <a:noAutofit/>
+          </a:bodyPr>
+          <a:lstStyle/>
+          <a:p>
+            <a:pPr indent="0" lvl="0" marL="0" rtl="0" algn="l">
+              <a:spcBef>
+                <a:spcPts val="0"/>
+              </a:spcBef>
+              <a:spcAft>
+                <a:spcPts val="0"/>
+              </a:spcAft>
+              <a:buNone/>
+            </a:pPr>
+            <a:r>
+              <a:t/>
+            </a:r>
+            <a:endParaRPr/>
+          </a:p>
+        </p:txBody>
+      </p:sp>
+    </p:spTree>
+  </p:cSld>
+  <p:clrMapOvr>
+    <a:masterClrMapping/>
+  </p:clrMapOvr>
+</p:notes>
+</file>
+
+<file path=ppt/notesSlides/notesSlide22.xml><?xml version="1.0" encoding="utf-8"?>
+<p:notes xmlns:a="http://schemas.openxmlformats.org/drawingml/2006/main" xmlns:r="http://schemas.openxmlformats.org/officeDocument/2006/relationships" xmlns:mc="http://schemas.openxmlformats.org/markup-compatibility/2006" xmlns:mv="urn:schemas-microsoft-com:mac:vml" xmlns:p="http://schemas.openxmlformats.org/presentationml/2006/main" xmlns:c="http://schemas.openxmlformats.org/drawingml/2006/chart" xmlns:dgm="http://schemas.openxmlformats.org/drawingml/2006/diagram" xmlns:o="urn:schemas-microsoft-com:office:office" xmlns:v="urn:schemas-microsoft-com:vml" xmlns:pvml="urn:schemas-microsoft-com:office:powerpoint" xmlns:com="http://schemas.openxmlformats.org/drawingml/2006/compatibility" xmlns:p14="http://schemas.microsoft.com/office/powerpoint/2010/main" xmlns:p15="http://schemas.microsoft.com/office/powerpoint/2012/main" xmlns:ahyp="http://schemas.microsoft.com/office/drawing/2018/hyperlinkcolor" showMasterPhAnim="0" showMasterSp="0">
+  <p:cSld>
+    <p:spTree>
+      <p:nvGrpSpPr>
+        <p:cNvPr id="229" name="Shape 229"/>
+        <p:cNvGrpSpPr/>
+        <p:nvPr/>
+      </p:nvGrpSpPr>
+      <p:grpSpPr>
+        <a:xfrm>
+          <a:off x="0" y="0"/>
+          <a:ext cx="0" cy="0"/>
+          <a:chOff x="0" y="0"/>
+          <a:chExt cx="0" cy="0"/>
+        </a:xfrm>
+      </p:grpSpPr>
+      <p:sp>
+        <p:nvSpPr>
+          <p:cNvPr id="230" name="Google Shape;230;g361e6f52f36_4_0:notes"/>
+          <p:cNvSpPr/>
+          <p:nvPr>
+            <p:ph idx="2" type="sldImg"/>
+          </p:nvPr>
+        </p:nvSpPr>
+        <p:spPr>
+          <a:xfrm>
+            <a:off x="381300" y="685800"/>
+            <a:ext cx="6096000" cy="3429000"/>
+          </a:xfrm>
+          <a:custGeom>
+            <a:rect b="b" l="l" r="r" t="t"/>
+            <a:pathLst>
+              <a:path extrusionOk="0" h="120000" w="120000">
+                <a:moveTo>
+                  <a:pt x="0" y="0"/>
+                </a:moveTo>
+                <a:lnTo>
+                  <a:pt x="120000" y="0"/>
+                </a:lnTo>
+                <a:lnTo>
+                  <a:pt x="120000" y="120000"/>
+                </a:lnTo>
+                <a:lnTo>
+                  <a:pt x="0" y="120000"/>
+                </a:lnTo>
+                <a:close/>
+              </a:path>
+            </a:pathLst>
+          </a:custGeom>
+        </p:spPr>
+      </p:sp>
+      <p:sp>
+        <p:nvSpPr>
+          <p:cNvPr id="231" name="Google Shape;231;g361e6f52f36_4_0:notes"/>
+          <p:cNvSpPr txBox="1"/>
+          <p:nvPr>
+            <p:ph idx="1" type="body"/>
+          </p:nvPr>
+        </p:nvSpPr>
+        <p:spPr>
+          <a:xfrm>
+            <a:off x="685800" y="4343400"/>
+            <a:ext cx="5486400" cy="4114800"/>
+          </a:xfrm>
+          <a:prstGeom prst="rect">
+            <a:avLst/>
+          </a:prstGeom>
+        </p:spPr>
+        <p:txBody>
+          <a:bodyPr anchorCtr="0" anchor="t" bIns="91425" lIns="91425" spcFirstLastPara="1" rIns="91425" wrap="square" tIns="91425">
+            <a:noAutofit/>
+          </a:bodyPr>
+          <a:lstStyle/>
+          <a:p>
+            <a:pPr indent="0" lvl="0" marL="0" rtl="0" algn="l">
+              <a:spcBef>
+                <a:spcPts val="0"/>
+              </a:spcBef>
+              <a:spcAft>
+                <a:spcPts val="0"/>
+              </a:spcAft>
+              <a:buNone/>
+            </a:pPr>
+            <a:r>
+              <a:t/>
+            </a:r>
+            <a:endParaRPr/>
+          </a:p>
+        </p:txBody>
+      </p:sp>
+    </p:spTree>
+  </p:cSld>
+  <p:clrMapOvr>
+    <a:masterClrMapping/>
+  </p:clrMapOvr>
+</p:notes>
+</file>
+
+<file path=ppt/notesSlides/notesSlide23.xml><?xml version="1.0" encoding="utf-8"?>
+<p:notes xmlns:a="http://schemas.openxmlformats.org/drawingml/2006/main" xmlns:r="http://schemas.openxmlformats.org/officeDocument/2006/relationships" xmlns:mc="http://schemas.openxmlformats.org/markup-compatibility/2006" xmlns:mv="urn:schemas-microsoft-com:mac:vml" xmlns:p="http://schemas.openxmlformats.org/presentationml/2006/main" xmlns:c="http://schemas.openxmlformats.org/drawingml/2006/chart" xmlns:dgm="http://schemas.openxmlformats.org/drawingml/2006/diagram" xmlns:o="urn:schemas-microsoft-com:office:office" xmlns:v="urn:schemas-microsoft-com:vml" xmlns:pvml="urn:schemas-microsoft-com:office:powerpoint" xmlns:com="http://schemas.openxmlformats.org/drawingml/2006/compatibility" xmlns:p14="http://schemas.microsoft.com/office/powerpoint/2010/main" xmlns:p15="http://schemas.microsoft.com/office/powerpoint/2012/main" xmlns:ahyp="http://schemas.microsoft.com/office/drawing/2018/hyperlinkcolor" showMasterPhAnim="0" showMasterSp="0">
+  <p:cSld>
+    <p:spTree>
+      <p:nvGrpSpPr>
+        <p:cNvPr id="235" name="Shape 235"/>
+        <p:cNvGrpSpPr/>
+        <p:nvPr/>
+      </p:nvGrpSpPr>
+      <p:grpSpPr>
+        <a:xfrm>
+          <a:off x="0" y="0"/>
+          <a:ext cx="0" cy="0"/>
+          <a:chOff x="0" y="0"/>
+          <a:chExt cx="0" cy="0"/>
+        </a:xfrm>
+      </p:grpSpPr>
+      <p:sp>
+        <p:nvSpPr>
+          <p:cNvPr id="236" name="Google Shape;236;g361e6f52f36_0_5:notes"/>
+          <p:cNvSpPr/>
+          <p:nvPr>
+            <p:ph idx="2" type="sldImg"/>
+          </p:nvPr>
+        </p:nvSpPr>
+        <p:spPr>
+          <a:xfrm>
+            <a:off x="381300" y="685800"/>
+            <a:ext cx="6096000" cy="3429000"/>
+          </a:xfrm>
+          <a:custGeom>
+            <a:rect b="b" l="l" r="r" t="t"/>
+            <a:pathLst>
+              <a:path extrusionOk="0" h="120000" w="120000">
+                <a:moveTo>
+                  <a:pt x="0" y="0"/>
+                </a:moveTo>
+                <a:lnTo>
+                  <a:pt x="120000" y="0"/>
+                </a:lnTo>
+                <a:lnTo>
+                  <a:pt x="120000" y="120000"/>
+                </a:lnTo>
+                <a:lnTo>
+                  <a:pt x="0" y="120000"/>
+                </a:lnTo>
+                <a:close/>
+              </a:path>
+            </a:pathLst>
+          </a:custGeom>
+        </p:spPr>
+      </p:sp>
+      <p:sp>
+        <p:nvSpPr>
+          <p:cNvPr id="237" name="Google Shape;237;g361e6f52f36_0_5:notes"/>
           <p:cNvSpPr txBox="1"/>
           <p:nvPr>
             <p:ph idx="1" type="body"/>
@@ -9200,7 +9500,7 @@
             </a:pPr>
             <a:r>
               <a:rPr lang="en-GB"/>
-              <a:t>Results - Random Forest</a:t>
+              <a:t>Setup</a:t>
             </a:r>
             <a:endParaRPr/>
           </a:p>
@@ -9229,17 +9529,121 @@
           </a:bodyPr>
           <a:lstStyle/>
           <a:p>
-            <a:pPr indent="0" lvl="0" marL="0" rtl="0" algn="l">
-              <a:spcBef>
-                <a:spcPts val="0"/>
-              </a:spcBef>
-              <a:spcAft>
-                <a:spcPts val="1200"/>
-              </a:spcAft>
-              <a:buNone/>
-            </a:pPr>
-            <a:r>
-              <a:t/>
+            <a:pPr indent="-311150" lvl="0" marL="457200" rtl="0" algn="l">
+              <a:spcBef>
+                <a:spcPts val="0"/>
+              </a:spcBef>
+              <a:spcAft>
+                <a:spcPts val="0"/>
+              </a:spcAft>
+              <a:buSzPts val="1300"/>
+              <a:buChar char="●"/>
+            </a:pPr>
+            <a:r>
+              <a:rPr lang="en-GB"/>
+              <a:t>Hardware</a:t>
+            </a:r>
+            <a:endParaRPr/>
+          </a:p>
+          <a:p>
+            <a:pPr indent="-298450" lvl="1" marL="914400" rtl="0" algn="l">
+              <a:spcBef>
+                <a:spcPts val="0"/>
+              </a:spcBef>
+              <a:spcAft>
+                <a:spcPts val="0"/>
+              </a:spcAft>
+              <a:buSzPts val="1100"/>
+              <a:buChar char="○"/>
+            </a:pPr>
+            <a:r>
+              <a:rPr lang="en-GB"/>
+              <a:t>Ubuntu 22.04.5 LTS</a:t>
+            </a:r>
+            <a:endParaRPr/>
+          </a:p>
+          <a:p>
+            <a:pPr indent="-298450" lvl="1" marL="914400" rtl="0" algn="l">
+              <a:spcBef>
+                <a:spcPts val="0"/>
+              </a:spcBef>
+              <a:spcAft>
+                <a:spcPts val="0"/>
+              </a:spcAft>
+              <a:buSzPts val="1100"/>
+              <a:buChar char="○"/>
+            </a:pPr>
+            <a:r>
+              <a:rPr lang="en-GB"/>
+              <a:t>AMD Ryzen 7 7700X</a:t>
+            </a:r>
+            <a:endParaRPr/>
+          </a:p>
+          <a:p>
+            <a:pPr indent="-298450" lvl="1" marL="914400" rtl="0" algn="l">
+              <a:spcBef>
+                <a:spcPts val="0"/>
+              </a:spcBef>
+              <a:spcAft>
+                <a:spcPts val="0"/>
+              </a:spcAft>
+              <a:buSzPts val="1100"/>
+              <a:buChar char="○"/>
+            </a:pPr>
+            <a:r>
+              <a:rPr lang="en-GB"/>
+              <a:t>Nvidia Geforce RTX 3080</a:t>
+            </a:r>
+            <a:endParaRPr/>
+          </a:p>
+          <a:p>
+            <a:pPr indent="-311150" lvl="0" marL="457200" rtl="0" algn="l">
+              <a:spcBef>
+                <a:spcPts val="0"/>
+              </a:spcBef>
+              <a:spcAft>
+                <a:spcPts val="0"/>
+              </a:spcAft>
+              <a:buSzPts val="1300"/>
+              <a:buChar char="●"/>
+            </a:pPr>
+            <a:r>
+              <a:rPr lang="en-GB"/>
+              <a:t>Sliding window</a:t>
+            </a:r>
+            <a:endParaRPr/>
+          </a:p>
+          <a:p>
+            <a:pPr indent="-298450" lvl="1" marL="914400" rtl="0" algn="l">
+              <a:spcBef>
+                <a:spcPts val="0"/>
+              </a:spcBef>
+              <a:spcAft>
+                <a:spcPts val="0"/>
+              </a:spcAft>
+              <a:buSzPts val="1100"/>
+              <a:buChar char="○"/>
+            </a:pPr>
+            <a:r>
+              <a:rPr lang="en-GB"/>
+              <a:t>500 window size</a:t>
+            </a:r>
+            <a:endParaRPr/>
+          </a:p>
+          <a:p>
+            <a:pPr indent="-298450" lvl="1" marL="914400" rtl="0" algn="l">
+              <a:spcBef>
+                <a:spcPts val="0"/>
+              </a:spcBef>
+              <a:spcAft>
+                <a:spcPts val="0"/>
+              </a:spcAft>
+              <a:buSzPts val="1100"/>
+              <a:buChar char="○"/>
+            </a:pPr>
+            <a:r>
+              <a:rPr lang="en-GB"/>
+              <a:t>90% overlap</a:t>
             </a:r>
             <a:endParaRPr/>
           </a:p>
@@ -9247,50 +9651,21 @@
       </p:sp>
       <p:pic>
         <p:nvPicPr>
-          <p:cNvPr id="148" name="Google Shape;148;p22" title="Screenshot from 2025-06-01 08-03-16.png"/>
+          <p:cNvPr id="148" name="Google Shape;148;p22" title="Screenshot from 2025-06-12 07-57-00.png"/>
           <p:cNvPicPr preferRelativeResize="0"/>
           <p:nvPr/>
         </p:nvPicPr>
-        <p:blipFill>
+        <p:blipFill rotWithShape="1">
           <a:blip r:embed="rId3">
             <a:alphaModFix/>
           </a:blip>
-          <a:stretch>
-            <a:fillRect/>
-          </a:stretch>
+          <a:srcRect b="0" l="0" r="0" t="6323"/>
+          <a:stretch/>
         </p:blipFill>
         <p:spPr>
           <a:xfrm>
-            <a:off x="4857215" y="2078875"/>
-            <a:ext cx="3560931" cy="2261100"/>
-          </a:xfrm>
-          <a:prstGeom prst="rect">
-            <a:avLst/>
-          </a:prstGeom>
-          <a:noFill/>
-          <a:ln>
-            <a:noFill/>
-          </a:ln>
-        </p:spPr>
-      </p:pic>
-      <p:pic>
-        <p:nvPicPr>
-          <p:cNvPr id="149" name="Google Shape;149;p22" title="Screenshot from 2025-06-01 08-03-06.png"/>
-          <p:cNvPicPr preferRelativeResize="0"/>
-          <p:nvPr/>
-        </p:nvPicPr>
-        <p:blipFill>
-          <a:blip r:embed="rId4">
-            <a:alphaModFix/>
-          </a:blip>
-          <a:stretch>
-            <a:fillRect/>
-          </a:stretch>
-        </p:blipFill>
-        <p:spPr>
-          <a:xfrm>
-            <a:off x="729450" y="2078875"/>
-            <a:ext cx="3785275" cy="2261100"/>
+            <a:off x="4141025" y="1171175"/>
+            <a:ext cx="4124425" cy="3899250"/>
           </a:xfrm>
           <a:prstGeom prst="rect">
             <a:avLst/>
@@ -9314,7 +9689,7 @@
   <p:cSld>
     <p:spTree>
       <p:nvGrpSpPr>
-        <p:cNvPr id="153" name="Shape 153"/>
+        <p:cNvPr id="152" name="Shape 152"/>
         <p:cNvGrpSpPr/>
         <p:nvPr/>
       </p:nvGrpSpPr>
@@ -9328,7 +9703,7 @@
       </p:grpSpPr>
       <p:sp>
         <p:nvSpPr>
-          <p:cNvPr id="154" name="Google Shape;154;p23"/>
+          <p:cNvPr id="153" name="Google Shape;153;p23"/>
           <p:cNvSpPr txBox="1"/>
           <p:nvPr>
             <p:ph type="title"/>
@@ -9360,7 +9735,7 @@
             </a:pPr>
             <a:r>
               <a:rPr lang="en-GB"/>
-              <a:t>Results - SVM</a:t>
+              <a:t>Results - Random Forest</a:t>
             </a:r>
             <a:endParaRPr/>
           </a:p>
@@ -9368,7 +9743,7 @@
       </p:sp>
       <p:sp>
         <p:nvSpPr>
-          <p:cNvPr id="155" name="Google Shape;155;p23"/>
+          <p:cNvPr id="154" name="Google Shape;154;p23"/>
           <p:cNvSpPr txBox="1"/>
           <p:nvPr>
             <p:ph idx="1" type="body"/>
@@ -9407,7 +9782,7 @@
       </p:sp>
       <p:pic>
         <p:nvPicPr>
-          <p:cNvPr id="156" name="Google Shape;156;p23" title="Screenshot from 2025-06-01 08-03-57.png"/>
+          <p:cNvPr id="155" name="Google Shape;155;p23" title="Screenshot from 2025-06-01 08-03-16.png"/>
           <p:cNvPicPr preferRelativeResize="0"/>
           <p:nvPr/>
         </p:nvPicPr>
@@ -9421,8 +9796,8 @@
         </p:blipFill>
         <p:spPr>
           <a:xfrm>
-            <a:off x="729450" y="2078875"/>
-            <a:ext cx="3344525" cy="2261083"/>
+            <a:off x="4857215" y="2078875"/>
+            <a:ext cx="3560931" cy="2261100"/>
           </a:xfrm>
           <a:prstGeom prst="rect">
             <a:avLst/>
@@ -9435,7 +9810,7 @@
       </p:pic>
       <p:pic>
         <p:nvPicPr>
-          <p:cNvPr id="157" name="Google Shape;157;p23" title="Screenshot from 2025-06-01 08-04-10.png"/>
+          <p:cNvPr id="156" name="Google Shape;156;p23" title="Screenshot from 2025-06-01 08-03-06.png"/>
           <p:cNvPicPr preferRelativeResize="0"/>
           <p:nvPr/>
         </p:nvPicPr>
@@ -9449,8 +9824,8 @@
         </p:blipFill>
         <p:spPr>
           <a:xfrm>
-            <a:off x="5073625" y="2078875"/>
-            <a:ext cx="3344529" cy="2261100"/>
+            <a:off x="729450" y="2078875"/>
+            <a:ext cx="3785275" cy="2261100"/>
           </a:xfrm>
           <a:prstGeom prst="rect">
             <a:avLst/>
@@ -9474,7 +9849,7 @@
   <p:cSld>
     <p:spTree>
       <p:nvGrpSpPr>
-        <p:cNvPr id="161" name="Shape 161"/>
+        <p:cNvPr id="160" name="Shape 160"/>
         <p:cNvGrpSpPr/>
         <p:nvPr/>
       </p:nvGrpSpPr>
@@ -9488,7 +9863,7 @@
       </p:grpSpPr>
       <p:sp>
         <p:nvSpPr>
-          <p:cNvPr id="162" name="Google Shape;162;p24"/>
+          <p:cNvPr id="161" name="Google Shape;161;p24"/>
           <p:cNvSpPr txBox="1"/>
           <p:nvPr>
             <p:ph type="title"/>
@@ -9520,7 +9895,7 @@
             </a:pPr>
             <a:r>
               <a:rPr lang="en-GB"/>
-              <a:t>Results - KNN</a:t>
+              <a:t>Results - SVM</a:t>
             </a:r>
             <a:endParaRPr/>
           </a:p>
@@ -9528,7 +9903,7 @@
       </p:sp>
       <p:sp>
         <p:nvSpPr>
-          <p:cNvPr id="163" name="Google Shape;163;p24"/>
+          <p:cNvPr id="162" name="Google Shape;162;p24"/>
           <p:cNvSpPr txBox="1"/>
           <p:nvPr>
             <p:ph idx="1" type="body"/>
@@ -9567,7 +9942,7 @@
       </p:sp>
       <p:pic>
         <p:nvPicPr>
-          <p:cNvPr id="164" name="Google Shape;164;p24" title="Screenshot from 2025-06-01 08-04-34.png"/>
+          <p:cNvPr id="163" name="Google Shape;163;p24" title="Screenshot from 2025-06-01 08-03-57.png"/>
           <p:cNvPicPr preferRelativeResize="0"/>
           <p:nvPr/>
         </p:nvPicPr>
@@ -9582,7 +9957,7 @@
         <p:spPr>
           <a:xfrm>
             <a:off x="729450" y="2078875"/>
-            <a:ext cx="3421562" cy="2261100"/>
+            <a:ext cx="3344525" cy="2261083"/>
           </a:xfrm>
           <a:prstGeom prst="rect">
             <a:avLst/>
@@ -9595,7 +9970,7 @@
       </p:pic>
       <p:pic>
         <p:nvPicPr>
-          <p:cNvPr id="165" name="Google Shape;165;p24" title="Screenshot from 2025-06-01 08-04-42.png"/>
+          <p:cNvPr id="164" name="Google Shape;164;p24" title="Screenshot from 2025-06-01 08-04-10.png"/>
           <p:cNvPicPr preferRelativeResize="0"/>
           <p:nvPr/>
         </p:nvPicPr>
@@ -9609,8 +9984,8 @@
         </p:blipFill>
         <p:spPr>
           <a:xfrm>
-            <a:off x="4996591" y="2078875"/>
-            <a:ext cx="3421558" cy="2261100"/>
+            <a:off x="5073625" y="2078875"/>
+            <a:ext cx="3344529" cy="2261100"/>
           </a:xfrm>
           <a:prstGeom prst="rect">
             <a:avLst/>
@@ -9634,7 +10009,7 @@
   <p:cSld>
     <p:spTree>
       <p:nvGrpSpPr>
-        <p:cNvPr id="169" name="Shape 169"/>
+        <p:cNvPr id="168" name="Shape 168"/>
         <p:cNvGrpSpPr/>
         <p:nvPr/>
       </p:nvGrpSpPr>
@@ -9648,7 +10023,7 @@
       </p:grpSpPr>
       <p:sp>
         <p:nvSpPr>
-          <p:cNvPr id="170" name="Google Shape;170;p25"/>
+          <p:cNvPr id="169" name="Google Shape;169;p25"/>
           <p:cNvSpPr txBox="1"/>
           <p:nvPr>
             <p:ph type="title"/>
@@ -9680,7 +10055,7 @@
             </a:pPr>
             <a:r>
               <a:rPr lang="en-GB"/>
-              <a:t>Results - MLP</a:t>
+              <a:t>Results - KNN</a:t>
             </a:r>
             <a:endParaRPr/>
           </a:p>
@@ -9688,7 +10063,7 @@
       </p:sp>
       <p:sp>
         <p:nvSpPr>
-          <p:cNvPr id="171" name="Google Shape;171;p25"/>
+          <p:cNvPr id="170" name="Google Shape;170;p25"/>
           <p:cNvSpPr txBox="1"/>
           <p:nvPr>
             <p:ph idx="1" type="body"/>
@@ -9727,7 +10102,7 @@
       </p:sp>
       <p:pic>
         <p:nvPicPr>
-          <p:cNvPr id="172" name="Google Shape;172;p25" title="Screenshot from 2025-06-01 08-05-09.png"/>
+          <p:cNvPr id="171" name="Google Shape;171;p25" title="Screenshot from 2025-06-01 08-04-34.png"/>
           <p:cNvPicPr preferRelativeResize="0"/>
           <p:nvPr/>
         </p:nvPicPr>
@@ -9742,7 +10117,7 @@
         <p:spPr>
           <a:xfrm>
             <a:off x="729450" y="2078875"/>
-            <a:ext cx="3421558" cy="2261100"/>
+            <a:ext cx="3421562" cy="2261100"/>
           </a:xfrm>
           <a:prstGeom prst="rect">
             <a:avLst/>
@@ -9755,7 +10130,7 @@
       </p:pic>
       <p:pic>
         <p:nvPicPr>
-          <p:cNvPr id="173" name="Google Shape;173;p25" title="Screenshot from 2025-06-01 08-05-19.png"/>
+          <p:cNvPr id="172" name="Google Shape;172;p25" title="Screenshot from 2025-06-01 08-04-42.png"/>
           <p:cNvPicPr preferRelativeResize="0"/>
           <p:nvPr/>
         </p:nvPicPr>
@@ -9769,8 +10144,8 @@
         </p:blipFill>
         <p:spPr>
           <a:xfrm>
-            <a:off x="4996600" y="2078881"/>
-            <a:ext cx="3421550" cy="2261094"/>
+            <a:off x="4996591" y="2078875"/>
+            <a:ext cx="3421558" cy="2261100"/>
           </a:xfrm>
           <a:prstGeom prst="rect">
             <a:avLst/>
@@ -9794,7 +10169,7 @@
   <p:cSld>
     <p:spTree>
       <p:nvGrpSpPr>
-        <p:cNvPr id="177" name="Shape 177"/>
+        <p:cNvPr id="176" name="Shape 176"/>
         <p:cNvGrpSpPr/>
         <p:nvPr/>
       </p:nvGrpSpPr>
@@ -9808,7 +10183,7 @@
       </p:grpSpPr>
       <p:sp>
         <p:nvSpPr>
-          <p:cNvPr id="178" name="Google Shape;178;p26"/>
+          <p:cNvPr id="177" name="Google Shape;177;p26"/>
           <p:cNvSpPr txBox="1"/>
           <p:nvPr>
             <p:ph type="title"/>
@@ -9840,7 +10215,7 @@
             </a:pPr>
             <a:r>
               <a:rPr lang="en-GB"/>
-              <a:t>Results - CNN</a:t>
+              <a:t>Results - MLP</a:t>
             </a:r>
             <a:endParaRPr/>
           </a:p>
@@ -9848,7 +10223,7 @@
       </p:sp>
       <p:sp>
         <p:nvSpPr>
-          <p:cNvPr id="179" name="Google Shape;179;p26"/>
+          <p:cNvPr id="178" name="Google Shape;178;p26"/>
           <p:cNvSpPr txBox="1"/>
           <p:nvPr>
             <p:ph idx="1" type="body"/>
@@ -9887,21 +10262,22 @@
       </p:sp>
       <p:pic>
         <p:nvPicPr>
-          <p:cNvPr id="180" name="Google Shape;180;p26" title="image.png"/>
+          <p:cNvPr id="179" name="Google Shape;179;p26" title="Screenshot from 2025-06-01 08-05-09.png"/>
           <p:cNvPicPr preferRelativeResize="0"/>
           <p:nvPr/>
         </p:nvPicPr>
-        <p:blipFill rotWithShape="1">
+        <p:blipFill>
           <a:blip r:embed="rId3">
             <a:alphaModFix/>
           </a:blip>
-          <a:srcRect b="0" l="0" r="0" t="50144"/>
-          <a:stretch/>
+          <a:stretch>
+            <a:fillRect/>
+          </a:stretch>
         </p:blipFill>
         <p:spPr>
           <a:xfrm>
-            <a:off x="4603365" y="2078875"/>
-            <a:ext cx="3814784" cy="2261100"/>
+            <a:off x="729450" y="2078875"/>
+            <a:ext cx="3421558" cy="2261100"/>
           </a:xfrm>
           <a:prstGeom prst="rect">
             <a:avLst/>
@@ -9914,21 +10290,22 @@
       </p:pic>
       <p:pic>
         <p:nvPicPr>
-          <p:cNvPr id="181" name="Google Shape;181;p26" title="image.png"/>
+          <p:cNvPr id="180" name="Google Shape;180;p26" title="Screenshot from 2025-06-01 08-05-19.png"/>
           <p:cNvPicPr preferRelativeResize="0"/>
           <p:nvPr/>
         </p:nvPicPr>
-        <p:blipFill rotWithShape="1">
-          <a:blip r:embed="rId3">
+        <p:blipFill>
+          <a:blip r:embed="rId4">
             <a:alphaModFix/>
           </a:blip>
-          <a:srcRect b="49917" l="0" r="0" t="0"/>
-          <a:stretch/>
+          <a:stretch>
+            <a:fillRect/>
+          </a:stretch>
         </p:blipFill>
         <p:spPr>
           <a:xfrm>
-            <a:off x="729450" y="2078875"/>
-            <a:ext cx="3904825" cy="2261100"/>
+            <a:off x="4996600" y="2078881"/>
+            <a:ext cx="3421550" cy="2261094"/>
           </a:xfrm>
           <a:prstGeom prst="rect">
             <a:avLst/>
@@ -9952,7 +10329,7 @@
   <p:cSld>
     <p:spTree>
       <p:nvGrpSpPr>
-        <p:cNvPr id="185" name="Shape 185"/>
+        <p:cNvPr id="184" name="Shape 184"/>
         <p:cNvGrpSpPr/>
         <p:nvPr/>
       </p:nvGrpSpPr>
@@ -9966,7 +10343,7 @@
       </p:grpSpPr>
       <p:sp>
         <p:nvSpPr>
-          <p:cNvPr id="186" name="Google Shape;186;p27"/>
+          <p:cNvPr id="185" name="Google Shape;185;p27"/>
           <p:cNvSpPr txBox="1"/>
           <p:nvPr>
             <p:ph type="title"/>
@@ -10004,9 +10381,48 @@
           </a:p>
         </p:txBody>
       </p:sp>
+      <p:sp>
+        <p:nvSpPr>
+          <p:cNvPr id="186" name="Google Shape;186;p27"/>
+          <p:cNvSpPr txBox="1"/>
+          <p:nvPr>
+            <p:ph idx="1" type="body"/>
+          </p:nvPr>
+        </p:nvSpPr>
+        <p:spPr>
+          <a:xfrm>
+            <a:off x="729450" y="2078875"/>
+            <a:ext cx="7688700" cy="2261100"/>
+          </a:xfrm>
+          <a:prstGeom prst="rect">
+            <a:avLst/>
+          </a:prstGeom>
+        </p:spPr>
+        <p:txBody>
+          <a:bodyPr anchorCtr="0" anchor="t" bIns="91425" lIns="91425" spcFirstLastPara="1" rIns="91425" wrap="square" tIns="91425">
+            <a:normAutofit/>
+          </a:bodyPr>
+          <a:lstStyle/>
+          <a:p>
+            <a:pPr indent="0" lvl="0" marL="0" rtl="0" algn="l">
+              <a:spcBef>
+                <a:spcPts val="0"/>
+              </a:spcBef>
+              <a:spcAft>
+                <a:spcPts val="1200"/>
+              </a:spcAft>
+              <a:buNone/>
+            </a:pPr>
+            <a:r>
+              <a:t/>
+            </a:r>
+            <a:endParaRPr/>
+          </a:p>
+        </p:txBody>
+      </p:sp>
       <p:pic>
         <p:nvPicPr>
-          <p:cNvPr id="187" name="Google Shape;187;p27" title="cnn_train_val_plot.png"/>
+          <p:cNvPr id="187" name="Google Shape;187;p27" title="Screenshot from 2025-06-12 07-54-47.png"/>
           <p:cNvPicPr preferRelativeResize="0"/>
           <p:nvPr/>
         </p:nvPicPr>
@@ -10020,8 +10436,36 @@
         </p:blipFill>
         <p:spPr>
           <a:xfrm>
-            <a:off x="1800" y="1853850"/>
-            <a:ext cx="9144000" cy="3048000"/>
+            <a:off x="4571990" y="1787875"/>
+            <a:ext cx="4583735" cy="3310475"/>
+          </a:xfrm>
+          <a:prstGeom prst="rect">
+            <a:avLst/>
+          </a:prstGeom>
+          <a:noFill/>
+          <a:ln>
+            <a:noFill/>
+          </a:ln>
+        </p:spPr>
+      </p:pic>
+      <p:pic>
+        <p:nvPicPr>
+          <p:cNvPr id="188" name="Google Shape;188;p27" title="Screenshot from 2025-06-12 07-54-34.png"/>
+          <p:cNvPicPr preferRelativeResize="0"/>
+          <p:nvPr/>
+        </p:nvPicPr>
+        <p:blipFill>
+          <a:blip r:embed="rId4">
+            <a:alphaModFix/>
+          </a:blip>
+          <a:stretch>
+            <a:fillRect/>
+          </a:stretch>
+        </p:blipFill>
+        <p:spPr>
+          <a:xfrm>
+            <a:off x="0" y="1787882"/>
+            <a:ext cx="4583724" cy="3310468"/>
           </a:xfrm>
           <a:prstGeom prst="rect">
             <a:avLst/>
@@ -10045,7 +10489,7 @@
   <p:cSld>
     <p:spTree>
       <p:nvGrpSpPr>
-        <p:cNvPr id="191" name="Shape 191"/>
+        <p:cNvPr id="192" name="Shape 192"/>
         <p:cNvGrpSpPr/>
         <p:nvPr/>
       </p:nvGrpSpPr>
@@ -10057,9 +10501,49 @@
           <a:chExt cx="0" cy="0"/>
         </a:xfrm>
       </p:grpSpPr>
+      <p:sp>
+        <p:nvSpPr>
+          <p:cNvPr id="193" name="Google Shape;193;p28"/>
+          <p:cNvSpPr txBox="1"/>
+          <p:nvPr>
+            <p:ph type="title"/>
+          </p:nvPr>
+        </p:nvSpPr>
+        <p:spPr>
+          <a:xfrm>
+            <a:off x="729450" y="1318650"/>
+            <a:ext cx="7688700" cy="535200"/>
+          </a:xfrm>
+          <a:prstGeom prst="rect">
+            <a:avLst/>
+          </a:prstGeom>
+        </p:spPr>
+        <p:txBody>
+          <a:bodyPr anchorCtr="0" anchor="t" bIns="91425" lIns="91425" spcFirstLastPara="1" rIns="91425" wrap="square" tIns="91425">
+            <a:normAutofit fontScale="90000"/>
+          </a:bodyPr>
+          <a:lstStyle/>
+          <a:p>
+            <a:pPr indent="0" lvl="0" marL="0" rtl="0" algn="l">
+              <a:spcBef>
+                <a:spcPts val="0"/>
+              </a:spcBef>
+              <a:spcAft>
+                <a:spcPts val="0"/>
+              </a:spcAft>
+              <a:buNone/>
+            </a:pPr>
+            <a:r>
+              <a:rPr lang="en-GB"/>
+              <a:t>Results - CNN</a:t>
+            </a:r>
+            <a:endParaRPr/>
+          </a:p>
+        </p:txBody>
+      </p:sp>
       <p:pic>
         <p:nvPicPr>
-          <p:cNvPr id="192" name="Google Shape;192;p28" title="cnn.png"/>
+          <p:cNvPr id="194" name="Google Shape;194;p28" title="cnn_train_val_plot.png"/>
           <p:cNvPicPr preferRelativeResize="0"/>
           <p:nvPr/>
         </p:nvPicPr>
@@ -10073,148 +10557,8 @@
         </p:blipFill>
         <p:spPr>
           <a:xfrm>
-            <a:off x="6079075" y="2787225"/>
-            <a:ext cx="3013200" cy="2260800"/>
-          </a:xfrm>
-          <a:prstGeom prst="rect">
-            <a:avLst/>
-          </a:prstGeom>
-          <a:noFill/>
-          <a:ln>
-            <a:noFill/>
-          </a:ln>
-        </p:spPr>
-      </p:pic>
-      <p:pic>
-        <p:nvPicPr>
-          <p:cNvPr id="193" name="Google Shape;193;p28" title="gradient_boosted_trees.png"/>
-          <p:cNvPicPr preferRelativeResize="0"/>
-          <p:nvPr/>
-        </p:nvPicPr>
-        <p:blipFill>
-          <a:blip r:embed="rId4">
-            <a:alphaModFix/>
-          </a:blip>
-          <a:stretch>
-            <a:fillRect/>
-          </a:stretch>
-        </p:blipFill>
-        <p:spPr>
-          <a:xfrm>
-            <a:off x="3064925" y="2787325"/>
-            <a:ext cx="3014133" cy="2260600"/>
-          </a:xfrm>
-          <a:prstGeom prst="rect">
-            <a:avLst/>
-          </a:prstGeom>
-          <a:noFill/>
-          <a:ln>
-            <a:noFill/>
-          </a:ln>
-        </p:spPr>
-      </p:pic>
-      <p:pic>
-        <p:nvPicPr>
-          <p:cNvPr id="194" name="Google Shape;194;p28" title="mlp.png"/>
-          <p:cNvPicPr preferRelativeResize="0"/>
-          <p:nvPr/>
-        </p:nvPicPr>
-        <p:blipFill>
-          <a:blip r:embed="rId5">
-            <a:alphaModFix/>
-          </a:blip>
-          <a:stretch>
-            <a:fillRect/>
-          </a:stretch>
-        </p:blipFill>
-        <p:spPr>
-          <a:xfrm>
-            <a:off x="0" y="2888125"/>
-            <a:ext cx="3013200" cy="2260800"/>
-          </a:xfrm>
-          <a:prstGeom prst="rect">
-            <a:avLst/>
-          </a:prstGeom>
-          <a:noFill/>
-          <a:ln>
-            <a:noFill/>
-          </a:ln>
-        </p:spPr>
-      </p:pic>
-      <p:pic>
-        <p:nvPicPr>
-          <p:cNvPr id="195" name="Google Shape;195;p28" title="random_forest.png"/>
-          <p:cNvPicPr preferRelativeResize="0"/>
-          <p:nvPr/>
-        </p:nvPicPr>
-        <p:blipFill>
-          <a:blip r:embed="rId6">
-            <a:alphaModFix/>
-          </a:blip>
-          <a:stretch>
-            <a:fillRect/>
-          </a:stretch>
-        </p:blipFill>
-        <p:spPr>
-          <a:xfrm>
-            <a:off x="0" y="627325"/>
-            <a:ext cx="3013200" cy="2260800"/>
-          </a:xfrm>
-          <a:prstGeom prst="rect">
-            <a:avLst/>
-          </a:prstGeom>
-          <a:noFill/>
-          <a:ln>
-            <a:noFill/>
-          </a:ln>
-        </p:spPr>
-      </p:pic>
-      <p:pic>
-        <p:nvPicPr>
-          <p:cNvPr id="196" name="Google Shape;196;p28" title="knn.png"/>
-          <p:cNvPicPr preferRelativeResize="0"/>
-          <p:nvPr/>
-        </p:nvPicPr>
-        <p:blipFill>
-          <a:blip r:embed="rId7">
-            <a:alphaModFix/>
-          </a:blip>
-          <a:stretch>
-            <a:fillRect/>
-          </a:stretch>
-        </p:blipFill>
-        <p:spPr>
-          <a:xfrm>
-            <a:off x="3065400" y="526525"/>
-            <a:ext cx="3013200" cy="2260800"/>
-          </a:xfrm>
-          <a:prstGeom prst="rect">
-            <a:avLst/>
-          </a:prstGeom>
-          <a:noFill/>
-          <a:ln>
-            <a:noFill/>
-          </a:ln>
-        </p:spPr>
-      </p:pic>
-      <p:pic>
-        <p:nvPicPr>
-          <p:cNvPr id="197" name="Google Shape;197;p28" title="mlp.png"/>
-          <p:cNvPicPr preferRelativeResize="0"/>
-          <p:nvPr/>
-        </p:nvPicPr>
-        <p:blipFill>
-          <a:blip r:embed="rId5">
-            <a:alphaModFix/>
-          </a:blip>
-          <a:stretch>
-            <a:fillRect/>
-          </a:stretch>
-        </p:blipFill>
-        <p:spPr>
-          <a:xfrm>
-            <a:off x="6130800" y="526525"/>
-            <a:ext cx="3013200" cy="2260800"/>
+            <a:off x="152400" y="2006250"/>
+            <a:ext cx="8839200" cy="2946400"/>
           </a:xfrm>
           <a:prstGeom prst="rect">
             <a:avLst/>
@@ -10238,7 +10582,7 @@
   <p:cSld>
     <p:spTree>
       <p:nvGrpSpPr>
-        <p:cNvPr id="201" name="Shape 201"/>
+        <p:cNvPr id="198" name="Shape 198"/>
         <p:cNvGrpSpPr/>
         <p:nvPr/>
       </p:nvGrpSpPr>
@@ -10250,49 +10594,9 @@
           <a:chExt cx="0" cy="0"/>
         </a:xfrm>
       </p:grpSpPr>
-      <p:sp>
-        <p:nvSpPr>
-          <p:cNvPr id="202" name="Google Shape;202;p29"/>
-          <p:cNvSpPr txBox="1"/>
-          <p:nvPr>
-            <p:ph type="title"/>
-          </p:nvPr>
-        </p:nvSpPr>
-        <p:spPr>
-          <a:xfrm>
-            <a:off x="729450" y="1318650"/>
-            <a:ext cx="7688700" cy="535200"/>
-          </a:xfrm>
-          <a:prstGeom prst="rect">
-            <a:avLst/>
-          </a:prstGeom>
-        </p:spPr>
-        <p:txBody>
-          <a:bodyPr anchorCtr="0" anchor="t" bIns="91425" lIns="91425" spcFirstLastPara="1" rIns="91425" wrap="square" tIns="91425">
-            <a:normAutofit fontScale="90000"/>
-          </a:bodyPr>
-          <a:lstStyle/>
-          <a:p>
-            <a:pPr indent="0" lvl="0" marL="0" rtl="0" algn="l">
-              <a:spcBef>
-                <a:spcPts val="0"/>
-              </a:spcBef>
-              <a:spcAft>
-                <a:spcPts val="0"/>
-              </a:spcAft>
-              <a:buNone/>
-            </a:pPr>
-            <a:r>
-              <a:rPr lang="en-GB"/>
-              <a:t>Accuracy Comparison</a:t>
-            </a:r>
-            <a:endParaRPr/>
-          </a:p>
-        </p:txBody>
-      </p:sp>
       <p:pic>
         <p:nvPicPr>
-          <p:cNvPr id="203" name="Google Shape;203;p29" title="model_accuracy_comparison.png"/>
+          <p:cNvPr id="199" name="Google Shape;199;p29" title="cnn_cm.png"/>
           <p:cNvPicPr preferRelativeResize="0"/>
           <p:nvPr/>
         </p:nvPicPr>
@@ -10306,8 +10610,148 @@
         </p:blipFill>
         <p:spPr>
           <a:xfrm>
-            <a:off x="1845450" y="1853850"/>
-            <a:ext cx="5345975" cy="3207575"/>
+            <a:off x="0" y="497900"/>
+            <a:ext cx="2968334" cy="2226250"/>
+          </a:xfrm>
+          <a:prstGeom prst="rect">
+            <a:avLst/>
+          </a:prstGeom>
+          <a:noFill/>
+          <a:ln>
+            <a:noFill/>
+          </a:ln>
+        </p:spPr>
+      </p:pic>
+      <p:pic>
+        <p:nvPicPr>
+          <p:cNvPr id="200" name="Google Shape;200;p29" title="gradient_boosted_trees_cm.png"/>
+          <p:cNvPicPr preferRelativeResize="0"/>
+          <p:nvPr/>
+        </p:nvPicPr>
+        <p:blipFill>
+          <a:blip r:embed="rId4">
+            <a:alphaModFix/>
+          </a:blip>
+          <a:stretch>
+            <a:fillRect/>
+          </a:stretch>
+        </p:blipFill>
+        <p:spPr>
+          <a:xfrm>
+            <a:off x="3225800" y="497900"/>
+            <a:ext cx="2970000" cy="2224800"/>
+          </a:xfrm>
+          <a:prstGeom prst="rect">
+            <a:avLst/>
+          </a:prstGeom>
+          <a:noFill/>
+          <a:ln>
+            <a:noFill/>
+          </a:ln>
+        </p:spPr>
+      </p:pic>
+      <p:pic>
+        <p:nvPicPr>
+          <p:cNvPr id="201" name="Google Shape;201;p29" title="knn_cm.png"/>
+          <p:cNvPicPr preferRelativeResize="0"/>
+          <p:nvPr/>
+        </p:nvPicPr>
+        <p:blipFill>
+          <a:blip r:embed="rId5">
+            <a:alphaModFix/>
+          </a:blip>
+          <a:stretch>
+            <a:fillRect/>
+          </a:stretch>
+        </p:blipFill>
+        <p:spPr>
+          <a:xfrm>
+            <a:off x="0" y="2917250"/>
+            <a:ext cx="2968324" cy="2226250"/>
+          </a:xfrm>
+          <a:prstGeom prst="rect">
+            <a:avLst/>
+          </a:prstGeom>
+          <a:noFill/>
+          <a:ln>
+            <a:noFill/>
+          </a:ln>
+        </p:spPr>
+      </p:pic>
+      <p:pic>
+        <p:nvPicPr>
+          <p:cNvPr id="202" name="Google Shape;202;p29" title="random_forest_cm.png"/>
+          <p:cNvPicPr preferRelativeResize="0"/>
+          <p:nvPr/>
+        </p:nvPicPr>
+        <p:blipFill>
+          <a:blip r:embed="rId6">
+            <a:alphaModFix/>
+          </a:blip>
+          <a:stretch>
+            <a:fillRect/>
+          </a:stretch>
+        </p:blipFill>
+        <p:spPr>
+          <a:xfrm>
+            <a:off x="3176359" y="2917975"/>
+            <a:ext cx="2970000" cy="2224800"/>
+          </a:xfrm>
+          <a:prstGeom prst="rect">
+            <a:avLst/>
+          </a:prstGeom>
+          <a:noFill/>
+          <a:ln>
+            <a:noFill/>
+          </a:ln>
+        </p:spPr>
+      </p:pic>
+      <p:pic>
+        <p:nvPicPr>
+          <p:cNvPr id="203" name="Google Shape;203;p29" title="svm_cm.png"/>
+          <p:cNvPicPr preferRelativeResize="0"/>
+          <p:nvPr/>
+        </p:nvPicPr>
+        <p:blipFill>
+          <a:blip r:embed="rId7">
+            <a:alphaModFix/>
+          </a:blip>
+          <a:stretch>
+            <a:fillRect/>
+          </a:stretch>
+        </p:blipFill>
+        <p:spPr>
+          <a:xfrm>
+            <a:off x="6195793" y="2917975"/>
+            <a:ext cx="2970000" cy="2224800"/>
+          </a:xfrm>
+          <a:prstGeom prst="rect">
+            <a:avLst/>
+          </a:prstGeom>
+          <a:noFill/>
+          <a:ln>
+            <a:noFill/>
+          </a:ln>
+        </p:spPr>
+      </p:pic>
+      <p:pic>
+        <p:nvPicPr>
+          <p:cNvPr id="204" name="Google Shape;204;p29" title="mlp_cm.png"/>
+          <p:cNvPicPr preferRelativeResize="0"/>
+          <p:nvPr/>
+        </p:nvPicPr>
+        <p:blipFill>
+          <a:blip r:embed="rId8">
+            <a:alphaModFix/>
+          </a:blip>
+          <a:stretch>
+            <a:fillRect/>
+          </a:stretch>
+        </p:blipFill>
+        <p:spPr>
+          <a:xfrm>
+            <a:off x="6195800" y="498625"/>
+            <a:ext cx="2970000" cy="2224800"/>
           </a:xfrm>
           <a:prstGeom prst="rect">
             <a:avLst/>
@@ -10331,7 +10775,7 @@
   <p:cSld>
     <p:spTree>
       <p:nvGrpSpPr>
-        <p:cNvPr id="207" name="Shape 207"/>
+        <p:cNvPr id="208" name="Shape 208"/>
         <p:cNvGrpSpPr/>
         <p:nvPr/>
       </p:nvGrpSpPr>
@@ -10343,9 +10787,49 @@
           <a:chExt cx="0" cy="0"/>
         </a:xfrm>
       </p:grpSpPr>
+      <p:sp>
+        <p:nvSpPr>
+          <p:cNvPr id="209" name="Google Shape;209;p30"/>
+          <p:cNvSpPr txBox="1"/>
+          <p:nvPr>
+            <p:ph type="title"/>
+          </p:nvPr>
+        </p:nvSpPr>
+        <p:spPr>
+          <a:xfrm>
+            <a:off x="729450" y="1318650"/>
+            <a:ext cx="7688700" cy="535200"/>
+          </a:xfrm>
+          <a:prstGeom prst="rect">
+            <a:avLst/>
+          </a:prstGeom>
+        </p:spPr>
+        <p:txBody>
+          <a:bodyPr anchorCtr="0" anchor="t" bIns="91425" lIns="91425" spcFirstLastPara="1" rIns="91425" wrap="square" tIns="91425">
+            <a:normAutofit fontScale="90000"/>
+          </a:bodyPr>
+          <a:lstStyle/>
+          <a:p>
+            <a:pPr indent="0" lvl="0" marL="0" rtl="0" algn="l">
+              <a:spcBef>
+                <a:spcPts val="0"/>
+              </a:spcBef>
+              <a:spcAft>
+                <a:spcPts val="0"/>
+              </a:spcAft>
+              <a:buNone/>
+            </a:pPr>
+            <a:r>
+              <a:rPr lang="en-GB"/>
+              <a:t>Accuracy Comparison</a:t>
+            </a:r>
+            <a:endParaRPr/>
+          </a:p>
+        </p:txBody>
+      </p:sp>
       <p:pic>
         <p:nvPicPr>
-          <p:cNvPr id="208" name="Google Shape;208;p30" title="model_training_time_comparison.png"/>
+          <p:cNvPr id="210" name="Google Shape;210;p30" title="model_accuracy_comparison.png"/>
           <p:cNvPicPr preferRelativeResize="0"/>
           <p:nvPr/>
         </p:nvPicPr>
@@ -10359,8 +10843,8 @@
         </p:blipFill>
         <p:spPr>
           <a:xfrm>
-            <a:off x="447150" y="789325"/>
-            <a:ext cx="8249700" cy="4194274"/>
+            <a:off x="1460788" y="1853850"/>
+            <a:ext cx="6222425" cy="3153575"/>
           </a:xfrm>
           <a:prstGeom prst="rect">
             <a:avLst/>
@@ -10384,7 +10868,7 @@
   <p:cSld>
     <p:spTree>
       <p:nvGrpSpPr>
-        <p:cNvPr id="212" name="Shape 212"/>
+        <p:cNvPr id="214" name="Shape 214"/>
         <p:cNvGrpSpPr/>
         <p:nvPr/>
       </p:nvGrpSpPr>
@@ -10396,206 +10880,34 @@
           <a:chExt cx="0" cy="0"/>
         </a:xfrm>
       </p:grpSpPr>
-      <p:sp>
-        <p:nvSpPr>
-          <p:cNvPr id="213" name="Google Shape;213;p31"/>
-          <p:cNvSpPr txBox="1"/>
-          <p:nvPr>
-            <p:ph type="title"/>
-          </p:nvPr>
-        </p:nvSpPr>
-        <p:spPr>
-          <a:xfrm>
-            <a:off x="729450" y="1318650"/>
-            <a:ext cx="7688700" cy="535200"/>
+      <p:pic>
+        <p:nvPicPr>
+          <p:cNvPr id="215" name="Google Shape;215;p31" title="model_training_time_comparison.png"/>
+          <p:cNvPicPr preferRelativeResize="0"/>
+          <p:nvPr/>
+        </p:nvPicPr>
+        <p:blipFill>
+          <a:blip r:embed="rId3">
+            <a:alphaModFix/>
+          </a:blip>
+          <a:stretch>
+            <a:fillRect/>
+          </a:stretch>
+        </p:blipFill>
+        <p:spPr>
+          <a:xfrm>
+            <a:off x="785814" y="600075"/>
+            <a:ext cx="7572375" cy="4543425"/>
           </a:xfrm>
           <a:prstGeom prst="rect">
             <a:avLst/>
           </a:prstGeom>
-        </p:spPr>
-        <p:txBody>
-          <a:bodyPr anchorCtr="0" anchor="t" bIns="91425" lIns="91425" spcFirstLastPara="1" rIns="91425" wrap="square" tIns="91425">
-            <a:normAutofit fontScale="90000"/>
-          </a:bodyPr>
-          <a:lstStyle/>
-          <a:p>
-            <a:pPr indent="0" lvl="0" marL="0" rtl="0" algn="l">
-              <a:spcBef>
-                <a:spcPts val="0"/>
-              </a:spcBef>
-              <a:spcAft>
-                <a:spcPts val="0"/>
-              </a:spcAft>
-              <a:buNone/>
-            </a:pPr>
-            <a:r>
-              <a:rPr lang="en-GB"/>
-              <a:t>Team Contribution</a:t>
-            </a:r>
-            <a:endParaRPr/>
-          </a:p>
-        </p:txBody>
-      </p:sp>
-      <p:sp>
-        <p:nvSpPr>
-          <p:cNvPr id="214" name="Google Shape;214;p31"/>
-          <p:cNvSpPr txBox="1"/>
-          <p:nvPr>
-            <p:ph idx="1" type="body"/>
-          </p:nvPr>
-        </p:nvSpPr>
-        <p:spPr>
-          <a:xfrm>
-            <a:off x="729450" y="2078875"/>
-            <a:ext cx="7688700" cy="2261100"/>
-          </a:xfrm>
-          <a:prstGeom prst="rect">
-            <a:avLst/>
-          </a:prstGeom>
-        </p:spPr>
-        <p:txBody>
-          <a:bodyPr anchorCtr="0" anchor="t" bIns="91425" lIns="91425" spcFirstLastPara="1" rIns="91425" wrap="square" tIns="91425">
-            <a:normAutofit/>
-          </a:bodyPr>
-          <a:lstStyle/>
-          <a:p>
-            <a:pPr indent="-311150" lvl="0" marL="457200" rtl="0" algn="l">
-              <a:spcBef>
-                <a:spcPts val="0"/>
-              </a:spcBef>
-              <a:spcAft>
-                <a:spcPts val="0"/>
-              </a:spcAft>
-              <a:buSzPts val="1300"/>
-              <a:buChar char="●"/>
-            </a:pPr>
-            <a:r>
-              <a:rPr lang="en-GB"/>
-              <a:t>Lukas</a:t>
-            </a:r>
-            <a:endParaRPr/>
-          </a:p>
-          <a:p>
-            <a:pPr indent="-298450" lvl="1" marL="914400" rtl="0" algn="l">
-              <a:spcBef>
-                <a:spcPts val="0"/>
-              </a:spcBef>
-              <a:spcAft>
-                <a:spcPts val="0"/>
-              </a:spcAft>
-              <a:buSzPts val="1100"/>
-              <a:buChar char="○"/>
-            </a:pPr>
-            <a:r>
-              <a:rPr lang="en-GB"/>
-              <a:t>Model Training </a:t>
-            </a:r>
-            <a:endParaRPr/>
-          </a:p>
-          <a:p>
-            <a:pPr indent="-298450" lvl="1" marL="914400" rtl="0" algn="l">
-              <a:spcBef>
-                <a:spcPts val="0"/>
-              </a:spcBef>
-              <a:spcAft>
-                <a:spcPts val="0"/>
-              </a:spcAft>
-              <a:buSzPts val="1100"/>
-              <a:buChar char="○"/>
-            </a:pPr>
-            <a:r>
-              <a:rPr lang="en-GB"/>
-              <a:t>PPT preparation</a:t>
-            </a:r>
-            <a:endParaRPr/>
-          </a:p>
-          <a:p>
-            <a:pPr indent="-298450" lvl="1" marL="914400" rtl="0" algn="l">
-              <a:spcBef>
-                <a:spcPts val="0"/>
-              </a:spcBef>
-              <a:spcAft>
-                <a:spcPts val="0"/>
-              </a:spcAft>
-              <a:buSzPts val="1100"/>
-              <a:buChar char="○"/>
-            </a:pPr>
-            <a:r>
-              <a:rPr lang="en-GB"/>
-              <a:t>Documentation</a:t>
-            </a:r>
-            <a:endParaRPr/>
-          </a:p>
-          <a:p>
-            <a:pPr indent="-298450" lvl="1" marL="914400" rtl="0" algn="l">
-              <a:spcBef>
-                <a:spcPts val="0"/>
-              </a:spcBef>
-              <a:spcAft>
-                <a:spcPts val="0"/>
-              </a:spcAft>
-              <a:buSzPts val="1100"/>
-              <a:buChar char="○"/>
-            </a:pPr>
-            <a:r>
-              <a:rPr lang="en-GB"/>
-              <a:t>Recording</a:t>
-            </a:r>
-            <a:endParaRPr/>
-          </a:p>
-          <a:p>
-            <a:pPr indent="-311150" lvl="0" marL="457200" rtl="0" algn="l">
-              <a:spcBef>
-                <a:spcPts val="0"/>
-              </a:spcBef>
-              <a:spcAft>
-                <a:spcPts val="0"/>
-              </a:spcAft>
-              <a:buSzPts val="1300"/>
-              <a:buChar char="●"/>
-            </a:pPr>
-            <a:r>
-              <a:rPr lang="en-GB"/>
-              <a:t>Chaw Thiri San</a:t>
-            </a:r>
-            <a:endParaRPr/>
-          </a:p>
-          <a:p>
-            <a:pPr indent="-298450" lvl="1" marL="914400" rtl="0" algn="l">
-              <a:spcBef>
-                <a:spcPts val="0"/>
-              </a:spcBef>
-              <a:spcAft>
-                <a:spcPts val="0"/>
-              </a:spcAft>
-              <a:buSzPts val="1100"/>
-              <a:buChar char="○"/>
-            </a:pPr>
-            <a:r>
-              <a:rPr lang="en-GB"/>
-              <a:t>Model Training</a:t>
-            </a:r>
-            <a:endParaRPr/>
-          </a:p>
-          <a:p>
-            <a:pPr indent="-298450" lvl="1" marL="914400" rtl="0" algn="l">
-              <a:spcBef>
-                <a:spcPts val="0"/>
-              </a:spcBef>
-              <a:spcAft>
-                <a:spcPts val="0"/>
-              </a:spcAft>
-              <a:buSzPts val="1100"/>
-              <a:buChar char="○"/>
-            </a:pPr>
-            <a:r>
-              <a:rPr lang="en-GB"/>
-              <a:t>PPT preparation</a:t>
-            </a:r>
-            <a:endParaRPr/>
-          </a:p>
-        </p:txBody>
-      </p:sp>
+          <a:noFill/>
+          <a:ln>
+            <a:noFill/>
+          </a:ln>
+        </p:spPr>
+      </p:pic>
     </p:spTree>
   </p:cSld>
   <p:clrMapOvr>
@@ -11581,7 +11893,7 @@
   <p:cSld>
     <p:spTree>
       <p:nvGrpSpPr>
-        <p:cNvPr id="218" name="Shape 218"/>
+        <p:cNvPr id="219" name="Shape 219"/>
         <p:cNvGrpSpPr/>
         <p:nvPr/>
       </p:nvGrpSpPr>
@@ -11595,7 +11907,593 @@
       </p:grpSpPr>
       <p:sp>
         <p:nvSpPr>
-          <p:cNvPr id="219" name="Google Shape;219;p32"/>
+          <p:cNvPr id="220" name="Google Shape;220;p32"/>
+          <p:cNvSpPr txBox="1"/>
+          <p:nvPr>
+            <p:ph type="title"/>
+          </p:nvPr>
+        </p:nvSpPr>
+        <p:spPr>
+          <a:xfrm>
+            <a:off x="729450" y="1318650"/>
+            <a:ext cx="7688700" cy="535200"/>
+          </a:xfrm>
+          <a:prstGeom prst="rect">
+            <a:avLst/>
+          </a:prstGeom>
+        </p:spPr>
+        <p:txBody>
+          <a:bodyPr anchorCtr="0" anchor="t" bIns="91425" lIns="91425" spcFirstLastPara="1" rIns="91425" wrap="square" tIns="91425">
+            <a:normAutofit fontScale="90000"/>
+          </a:bodyPr>
+          <a:lstStyle/>
+          <a:p>
+            <a:pPr indent="0" lvl="0" marL="0" rtl="0" algn="l">
+              <a:spcBef>
+                <a:spcPts val="0"/>
+              </a:spcBef>
+              <a:spcAft>
+                <a:spcPts val="0"/>
+              </a:spcAft>
+              <a:buNone/>
+            </a:pPr>
+            <a:r>
+              <a:rPr lang="en-GB"/>
+              <a:t>Demo</a:t>
+            </a:r>
+            <a:endParaRPr/>
+          </a:p>
+        </p:txBody>
+      </p:sp>
+      <p:sp>
+        <p:nvSpPr>
+          <p:cNvPr id="221" name="Google Shape;221;p32"/>
+          <p:cNvSpPr txBox="1"/>
+          <p:nvPr>
+            <p:ph idx="1" type="body"/>
+          </p:nvPr>
+        </p:nvSpPr>
+        <p:spPr>
+          <a:xfrm>
+            <a:off x="729450" y="2078875"/>
+            <a:ext cx="7688700" cy="2261100"/>
+          </a:xfrm>
+          <a:prstGeom prst="rect">
+            <a:avLst/>
+          </a:prstGeom>
+        </p:spPr>
+        <p:txBody>
+          <a:bodyPr anchorCtr="0" anchor="t" bIns="91425" lIns="91425" spcFirstLastPara="1" rIns="91425" wrap="square" tIns="91425">
+            <a:normAutofit/>
+          </a:bodyPr>
+          <a:lstStyle/>
+          <a:p>
+            <a:pPr indent="0" lvl="0" marL="0" rtl="0" algn="l">
+              <a:spcBef>
+                <a:spcPts val="0"/>
+              </a:spcBef>
+              <a:spcAft>
+                <a:spcPts val="1200"/>
+              </a:spcAft>
+              <a:buNone/>
+            </a:pPr>
+            <a:r>
+              <a:t/>
+            </a:r>
+            <a:endParaRPr/>
+          </a:p>
+        </p:txBody>
+      </p:sp>
+      <p:pic>
+        <p:nvPicPr>
+          <p:cNvPr id="222" name="Google Shape;222;p32" title="demo.mp4">
+            <a:hlinkClick r:id="rId3"/>
+          </p:cNvPr>
+          <p:cNvPicPr preferRelativeResize="0"/>
+          <p:nvPr/>
+        </p:nvPicPr>
+        <p:blipFill>
+          <a:blip r:embed="rId4">
+            <a:alphaModFix/>
+          </a:blip>
+          <a:stretch>
+            <a:fillRect/>
+          </a:stretch>
+        </p:blipFill>
+        <p:spPr>
+          <a:xfrm>
+            <a:off x="457200" y="0"/>
+            <a:ext cx="8229600" cy="5143500"/>
+          </a:xfrm>
+          <a:prstGeom prst="rect">
+            <a:avLst/>
+          </a:prstGeom>
+          <a:noFill/>
+          <a:ln>
+            <a:noFill/>
+          </a:ln>
+        </p:spPr>
+      </p:pic>
+    </p:spTree>
+  </p:cSld>
+  <p:clrMapOvr>
+    <a:masterClrMapping/>
+  </p:clrMapOvr>
+  <p:timing>
+    <p:tnLst>
+      <p:par>
+        <p:cTn dur="indefinite" nodeType="tmRoot" restart="never">
+          <p:childTnLst>
+            <p:seq concurrent="1" nextAc="seek">
+              <p:cTn dur="indefinite" id="2" nodeType="mainSeq">
+                <p:childTnLst>
+                  <p:par>
+                    <p:cTn fill="hold">
+                      <p:stCondLst>
+                        <p:cond delay="indefinite"/>
+                      </p:stCondLst>
+                      <p:childTnLst>
+                        <p:par>
+                          <p:cTn fill="hold">
+                            <p:stCondLst>
+                              <p:cond delay="0"/>
+                            </p:stCondLst>
+                            <p:childTnLst>
+                              <p:par>
+                                <p:cTn fill="hold" nodeType="clickEffect" presetClass="entr" presetID="10" presetSubtype="0">
+                                  <p:stCondLst>
+                                    <p:cond delay="0"/>
+                                  </p:stCondLst>
+                                  <p:childTnLst>
+                                    <p:set>
+                                      <p:cBhvr>
+                                        <p:cTn dur="1" fill="hold">
+                                          <p:stCondLst>
+                                            <p:cond delay="0"/>
+                                          </p:stCondLst>
+                                        </p:cTn>
+                                        <p:tgtEl>
+                                          <p:spTgt spid="222"/>
+                                        </p:tgtEl>
+                                        <p:attrNameLst>
+                                          <p:attrName>style.visibility</p:attrName>
+                                        </p:attrNameLst>
+                                      </p:cBhvr>
+                                      <p:to>
+                                        <p:strVal val="visible"/>
+                                      </p:to>
+                                    </p:set>
+                                    <p:animEffect filter="fade" transition="in">
+                                      <p:cBhvr>
+                                        <p:cTn dur="1000"/>
+                                        <p:tgtEl>
+                                          <p:spTgt spid="222"/>
+                                        </p:tgtEl>
+                                      </p:cBhvr>
+                                    </p:animEffect>
+                                  </p:childTnLst>
+                                </p:cTn>
+                              </p:par>
+                            </p:childTnLst>
+                          </p:cTn>
+                        </p:par>
+                      </p:childTnLst>
+                    </p:cTn>
+                  </p:par>
+                </p:childTnLst>
+              </p:cTn>
+              <p:prevCondLst>
+                <p:cond evt="onPrev">
+                  <p:tgtEl>
+                    <p:sldTgt/>
+                  </p:tgtEl>
+                </p:cond>
+              </p:prevCondLst>
+              <p:nextCondLst>
+                <p:cond evt="onNext">
+                  <p:tgtEl>
+                    <p:sldTgt/>
+                  </p:tgtEl>
+                </p:cond>
+              </p:nextCondLst>
+            </p:seq>
+          </p:childTnLst>
+        </p:cTn>
+      </p:par>
+    </p:tnLst>
+  </p:timing>
+</p:sld>
+</file>
+
+<file path=ppt/slides/slide21.xml><?xml version="1.0" encoding="utf-8"?>
+<p:sld xmlns:a="http://schemas.openxmlformats.org/drawingml/2006/main" xmlns:r="http://schemas.openxmlformats.org/officeDocument/2006/relationships" xmlns:mc="http://schemas.openxmlformats.org/markup-compatibility/2006" xmlns:mv="urn:schemas-microsoft-com:mac:vml" xmlns:p="http://schemas.openxmlformats.org/presentationml/2006/main" xmlns:c="http://schemas.openxmlformats.org/drawingml/2006/chart" xmlns:dgm="http://schemas.openxmlformats.org/drawingml/2006/diagram" xmlns:o="urn:schemas-microsoft-com:office:office" xmlns:v="urn:schemas-microsoft-com:vml" xmlns:pvml="urn:schemas-microsoft-com:office:powerpoint" xmlns:com="http://schemas.openxmlformats.org/drawingml/2006/compatibility" xmlns:p14="http://schemas.microsoft.com/office/powerpoint/2010/main" xmlns:p15="http://schemas.microsoft.com/office/powerpoint/2012/main" xmlns:ahyp="http://schemas.microsoft.com/office/drawing/2018/hyperlinkcolor">
+  <p:cSld>
+    <p:spTree>
+      <p:nvGrpSpPr>
+        <p:cNvPr id="226" name="Shape 226"/>
+        <p:cNvGrpSpPr/>
+        <p:nvPr/>
+      </p:nvGrpSpPr>
+      <p:grpSpPr>
+        <a:xfrm>
+          <a:off x="0" y="0"/>
+          <a:ext cx="0" cy="0"/>
+          <a:chOff x="0" y="0"/>
+          <a:chExt cx="0" cy="0"/>
+        </a:xfrm>
+      </p:grpSpPr>
+      <p:sp>
+        <p:nvSpPr>
+          <p:cNvPr id="227" name="Google Shape;227;p33"/>
+          <p:cNvSpPr txBox="1"/>
+          <p:nvPr>
+            <p:ph type="title"/>
+          </p:nvPr>
+        </p:nvSpPr>
+        <p:spPr>
+          <a:xfrm>
+            <a:off x="729450" y="1318650"/>
+            <a:ext cx="7688700" cy="535200"/>
+          </a:xfrm>
+          <a:prstGeom prst="rect">
+            <a:avLst/>
+          </a:prstGeom>
+        </p:spPr>
+        <p:txBody>
+          <a:bodyPr anchorCtr="0" anchor="t" bIns="91425" lIns="91425" spcFirstLastPara="1" rIns="91425" wrap="square" tIns="91425">
+            <a:normAutofit fontScale="90000"/>
+          </a:bodyPr>
+          <a:lstStyle/>
+          <a:p>
+            <a:pPr indent="0" lvl="0" marL="0" rtl="0" algn="l">
+              <a:spcBef>
+                <a:spcPts val="0"/>
+              </a:spcBef>
+              <a:spcAft>
+                <a:spcPts val="0"/>
+              </a:spcAft>
+              <a:buNone/>
+            </a:pPr>
+            <a:r>
+              <a:rPr lang="en-GB"/>
+              <a:t>Conclusion</a:t>
+            </a:r>
+            <a:endParaRPr/>
+          </a:p>
+        </p:txBody>
+      </p:sp>
+      <p:sp>
+        <p:nvSpPr>
+          <p:cNvPr id="228" name="Google Shape;228;p33"/>
+          <p:cNvSpPr txBox="1"/>
+          <p:nvPr>
+            <p:ph idx="1" type="body"/>
+          </p:nvPr>
+        </p:nvSpPr>
+        <p:spPr>
+          <a:xfrm>
+            <a:off x="729450" y="2078875"/>
+            <a:ext cx="7688700" cy="2261100"/>
+          </a:xfrm>
+          <a:prstGeom prst="rect">
+            <a:avLst/>
+          </a:prstGeom>
+        </p:spPr>
+        <p:txBody>
+          <a:bodyPr anchorCtr="0" anchor="t" bIns="91425" lIns="91425" spcFirstLastPara="1" rIns="91425" wrap="square" tIns="91425">
+            <a:normAutofit/>
+          </a:bodyPr>
+          <a:lstStyle/>
+          <a:p>
+            <a:pPr indent="-311150" lvl="0" marL="457200" rtl="0" algn="l">
+              <a:spcBef>
+                <a:spcPts val="0"/>
+              </a:spcBef>
+              <a:spcAft>
+                <a:spcPts val="0"/>
+              </a:spcAft>
+              <a:buSzPts val="1300"/>
+              <a:buChar char="●"/>
+            </a:pPr>
+            <a:r>
+              <a:rPr lang="en-GB"/>
+              <a:t>Random Forest </a:t>
+            </a:r>
+            <a:r>
+              <a:rPr lang="en-GB"/>
+              <a:t>performed surprisingly good!</a:t>
+            </a:r>
+            <a:endParaRPr/>
+          </a:p>
+          <a:p>
+            <a:pPr indent="-311150" lvl="0" marL="457200" rtl="0" algn="l">
+              <a:spcBef>
+                <a:spcPts val="0"/>
+              </a:spcBef>
+              <a:spcAft>
+                <a:spcPts val="0"/>
+              </a:spcAft>
+              <a:buSzPts val="1300"/>
+              <a:buChar char="●"/>
+            </a:pPr>
+            <a:r>
+              <a:rPr lang="en-GB"/>
+              <a:t>However, CNN best out of all</a:t>
+            </a:r>
+            <a:endParaRPr/>
+          </a:p>
+          <a:p>
+            <a:pPr indent="-298450" lvl="1" marL="914400" rtl="0" algn="l">
+              <a:spcBef>
+                <a:spcPts val="0"/>
+              </a:spcBef>
+              <a:spcAft>
+                <a:spcPts val="0"/>
+              </a:spcAft>
+              <a:buSzPts val="1100"/>
+              <a:buChar char="○"/>
+            </a:pPr>
+            <a:r>
+              <a:rPr lang="en-GB"/>
+              <a:t>Caution: Not to high values of Overlap otherwise overfitting</a:t>
+            </a:r>
+            <a:endParaRPr/>
+          </a:p>
+        </p:txBody>
+      </p:sp>
+    </p:spTree>
+  </p:cSld>
+  <p:clrMapOvr>
+    <a:masterClrMapping/>
+  </p:clrMapOvr>
+</p:sld>
+</file>
+
+<file path=ppt/slides/slide22.xml><?xml version="1.0" encoding="utf-8"?>
+<p:sld xmlns:a="http://schemas.openxmlformats.org/drawingml/2006/main" xmlns:r="http://schemas.openxmlformats.org/officeDocument/2006/relationships" xmlns:mc="http://schemas.openxmlformats.org/markup-compatibility/2006" xmlns:mv="urn:schemas-microsoft-com:mac:vml" xmlns:p="http://schemas.openxmlformats.org/presentationml/2006/main" xmlns:c="http://schemas.openxmlformats.org/drawingml/2006/chart" xmlns:dgm="http://schemas.openxmlformats.org/drawingml/2006/diagram" xmlns:o="urn:schemas-microsoft-com:office:office" xmlns:v="urn:schemas-microsoft-com:vml" xmlns:pvml="urn:schemas-microsoft-com:office:powerpoint" xmlns:com="http://schemas.openxmlformats.org/drawingml/2006/compatibility" xmlns:p14="http://schemas.microsoft.com/office/powerpoint/2010/main" xmlns:p15="http://schemas.microsoft.com/office/powerpoint/2012/main" xmlns:ahyp="http://schemas.microsoft.com/office/drawing/2018/hyperlinkcolor">
+  <p:cSld>
+    <p:spTree>
+      <p:nvGrpSpPr>
+        <p:cNvPr id="232" name="Shape 232"/>
+        <p:cNvGrpSpPr/>
+        <p:nvPr/>
+      </p:nvGrpSpPr>
+      <p:grpSpPr>
+        <a:xfrm>
+          <a:off x="0" y="0"/>
+          <a:ext cx="0" cy="0"/>
+          <a:chOff x="0" y="0"/>
+          <a:chExt cx="0" cy="0"/>
+        </a:xfrm>
+      </p:grpSpPr>
+      <p:sp>
+        <p:nvSpPr>
+          <p:cNvPr id="233" name="Google Shape;233;p34"/>
+          <p:cNvSpPr txBox="1"/>
+          <p:nvPr>
+            <p:ph type="title"/>
+          </p:nvPr>
+        </p:nvSpPr>
+        <p:spPr>
+          <a:xfrm>
+            <a:off x="729450" y="1318650"/>
+            <a:ext cx="7688700" cy="535200"/>
+          </a:xfrm>
+          <a:prstGeom prst="rect">
+            <a:avLst/>
+          </a:prstGeom>
+        </p:spPr>
+        <p:txBody>
+          <a:bodyPr anchorCtr="0" anchor="t" bIns="91425" lIns="91425" spcFirstLastPara="1" rIns="91425" wrap="square" tIns="91425">
+            <a:normAutofit fontScale="90000"/>
+          </a:bodyPr>
+          <a:lstStyle/>
+          <a:p>
+            <a:pPr indent="0" lvl="0" marL="0" rtl="0" algn="l">
+              <a:spcBef>
+                <a:spcPts val="0"/>
+              </a:spcBef>
+              <a:spcAft>
+                <a:spcPts val="0"/>
+              </a:spcAft>
+              <a:buNone/>
+            </a:pPr>
+            <a:r>
+              <a:rPr lang="en-GB"/>
+              <a:t>Team Contribution</a:t>
+            </a:r>
+            <a:endParaRPr/>
+          </a:p>
+        </p:txBody>
+      </p:sp>
+      <p:sp>
+        <p:nvSpPr>
+          <p:cNvPr id="234" name="Google Shape;234;p34"/>
+          <p:cNvSpPr txBox="1"/>
+          <p:nvPr>
+            <p:ph idx="1" type="body"/>
+          </p:nvPr>
+        </p:nvSpPr>
+        <p:spPr>
+          <a:xfrm>
+            <a:off x="729450" y="2078875"/>
+            <a:ext cx="7688700" cy="2261100"/>
+          </a:xfrm>
+          <a:prstGeom prst="rect">
+            <a:avLst/>
+          </a:prstGeom>
+        </p:spPr>
+        <p:txBody>
+          <a:bodyPr anchorCtr="0" anchor="t" bIns="91425" lIns="91425" spcFirstLastPara="1" rIns="91425" wrap="square" tIns="91425">
+            <a:normAutofit/>
+          </a:bodyPr>
+          <a:lstStyle/>
+          <a:p>
+            <a:pPr indent="-311150" lvl="0" marL="457200" rtl="0" algn="l">
+              <a:spcBef>
+                <a:spcPts val="0"/>
+              </a:spcBef>
+              <a:spcAft>
+                <a:spcPts val="0"/>
+              </a:spcAft>
+              <a:buSzPts val="1300"/>
+              <a:buChar char="●"/>
+            </a:pPr>
+            <a:r>
+              <a:rPr lang="en-GB"/>
+              <a:t>Lukas</a:t>
+            </a:r>
+            <a:endParaRPr/>
+          </a:p>
+          <a:p>
+            <a:pPr indent="-298450" lvl="1" marL="914400" rtl="0" algn="l">
+              <a:spcBef>
+                <a:spcPts val="0"/>
+              </a:spcBef>
+              <a:spcAft>
+                <a:spcPts val="0"/>
+              </a:spcAft>
+              <a:buSzPts val="1100"/>
+              <a:buChar char="○"/>
+            </a:pPr>
+            <a:r>
+              <a:rPr lang="en-GB"/>
+              <a:t>Model Training </a:t>
+            </a:r>
+            <a:endParaRPr/>
+          </a:p>
+          <a:p>
+            <a:pPr indent="-298450" lvl="1" marL="914400" rtl="0" algn="l">
+              <a:spcBef>
+                <a:spcPts val="0"/>
+              </a:spcBef>
+              <a:spcAft>
+                <a:spcPts val="0"/>
+              </a:spcAft>
+              <a:buSzPts val="1100"/>
+              <a:buChar char="○"/>
+            </a:pPr>
+            <a:r>
+              <a:rPr lang="en-GB"/>
+              <a:t>PPT preparation</a:t>
+            </a:r>
+            <a:endParaRPr/>
+          </a:p>
+          <a:p>
+            <a:pPr indent="-298450" lvl="1" marL="914400" rtl="0" algn="l">
+              <a:spcBef>
+                <a:spcPts val="0"/>
+              </a:spcBef>
+              <a:spcAft>
+                <a:spcPts val="0"/>
+              </a:spcAft>
+              <a:buSzPts val="1100"/>
+              <a:buChar char="○"/>
+            </a:pPr>
+            <a:r>
+              <a:rPr lang="en-GB"/>
+              <a:t>Documentation</a:t>
+            </a:r>
+            <a:endParaRPr/>
+          </a:p>
+          <a:p>
+            <a:pPr indent="-298450" lvl="1" marL="914400" rtl="0" algn="l">
+              <a:spcBef>
+                <a:spcPts val="0"/>
+              </a:spcBef>
+              <a:spcAft>
+                <a:spcPts val="0"/>
+              </a:spcAft>
+              <a:buSzPts val="1100"/>
+              <a:buChar char="○"/>
+            </a:pPr>
+            <a:r>
+              <a:rPr lang="en-GB"/>
+              <a:t>Recording</a:t>
+            </a:r>
+            <a:endParaRPr/>
+          </a:p>
+          <a:p>
+            <a:pPr indent="-311150" lvl="0" marL="457200" rtl="0" algn="l">
+              <a:spcBef>
+                <a:spcPts val="0"/>
+              </a:spcBef>
+              <a:spcAft>
+                <a:spcPts val="0"/>
+              </a:spcAft>
+              <a:buSzPts val="1300"/>
+              <a:buChar char="●"/>
+            </a:pPr>
+            <a:r>
+              <a:rPr lang="en-GB"/>
+              <a:t>Chaw Thiri San</a:t>
+            </a:r>
+            <a:endParaRPr/>
+          </a:p>
+          <a:p>
+            <a:pPr indent="-298450" lvl="1" marL="914400" rtl="0" algn="l">
+              <a:spcBef>
+                <a:spcPts val="0"/>
+              </a:spcBef>
+              <a:spcAft>
+                <a:spcPts val="0"/>
+              </a:spcAft>
+              <a:buSzPts val="1100"/>
+              <a:buChar char="○"/>
+            </a:pPr>
+            <a:r>
+              <a:rPr lang="en-GB"/>
+              <a:t>Model Training</a:t>
+            </a:r>
+            <a:endParaRPr/>
+          </a:p>
+          <a:p>
+            <a:pPr indent="-298450" lvl="1" marL="914400" rtl="0" algn="l">
+              <a:spcBef>
+                <a:spcPts val="0"/>
+              </a:spcBef>
+              <a:spcAft>
+                <a:spcPts val="0"/>
+              </a:spcAft>
+              <a:buSzPts val="1100"/>
+              <a:buChar char="○"/>
+            </a:pPr>
+            <a:r>
+              <a:rPr lang="en-GB"/>
+              <a:t>PPT preparation</a:t>
+            </a:r>
+            <a:endParaRPr/>
+          </a:p>
+        </p:txBody>
+      </p:sp>
+    </p:spTree>
+  </p:cSld>
+  <p:clrMapOvr>
+    <a:masterClrMapping/>
+  </p:clrMapOvr>
+</p:sld>
+</file>
+
+<file path=ppt/slides/slide23.xml><?xml version="1.0" encoding="utf-8"?>
+<p:sld xmlns:a="http://schemas.openxmlformats.org/drawingml/2006/main" xmlns:r="http://schemas.openxmlformats.org/officeDocument/2006/relationships" xmlns:mc="http://schemas.openxmlformats.org/markup-compatibility/2006" xmlns:mv="urn:schemas-microsoft-com:mac:vml" xmlns:p="http://schemas.openxmlformats.org/presentationml/2006/main" xmlns:c="http://schemas.openxmlformats.org/drawingml/2006/chart" xmlns:dgm="http://schemas.openxmlformats.org/drawingml/2006/diagram" xmlns:o="urn:schemas-microsoft-com:office:office" xmlns:v="urn:schemas-microsoft-com:vml" xmlns:pvml="urn:schemas-microsoft-com:office:powerpoint" xmlns:com="http://schemas.openxmlformats.org/drawingml/2006/compatibility" xmlns:p14="http://schemas.microsoft.com/office/powerpoint/2010/main" xmlns:p15="http://schemas.microsoft.com/office/powerpoint/2012/main" xmlns:ahyp="http://schemas.microsoft.com/office/drawing/2018/hyperlinkcolor">
+  <p:cSld>
+    <p:spTree>
+      <p:nvGrpSpPr>
+        <p:cNvPr id="238" name="Shape 238"/>
+        <p:cNvGrpSpPr/>
+        <p:nvPr/>
+      </p:nvGrpSpPr>
+      <p:grpSpPr>
+        <a:xfrm>
+          <a:off x="0" y="0"/>
+          <a:ext cx="0" cy="0"/>
+          <a:chOff x="0" y="0"/>
+          <a:chExt cx="0" cy="0"/>
+        </a:xfrm>
+      </p:grpSpPr>
+      <p:sp>
+        <p:nvSpPr>
+          <p:cNvPr id="239" name="Google Shape;239;p35"/>
           <p:cNvSpPr txBox="1"/>
           <p:nvPr>
             <p:ph type="ctrTitle"/>
@@ -11635,7 +12533,7 @@
       </p:sp>
       <p:sp>
         <p:nvSpPr>
-          <p:cNvPr id="220" name="Google Shape;220;p32"/>
+          <p:cNvPr id="240" name="Google Shape;240;p35"/>
           <p:cNvSpPr txBox="1"/>
           <p:nvPr>
             <p:ph idx="1" type="subTitle"/>

</xml_diff>